<commit_message>
fix module 8 presentation
</commit_message>
<xml_diff>
--- a/module_08/module8.pptx
+++ b/module_08/module8.pptx
@@ -7,18 +7,25 @@
   <p:sldIdLst>
     <p:sldId id="256" r:id="rId2"/>
     <p:sldId id="257" r:id="rId3"/>
-    <p:sldId id="258" r:id="rId4"/>
-    <p:sldId id="264" r:id="rId5"/>
-    <p:sldId id="262" r:id="rId6"/>
-    <p:sldId id="263" r:id="rId7"/>
-    <p:sldId id="259" r:id="rId8"/>
-    <p:sldId id="265" r:id="rId9"/>
-    <p:sldId id="266" r:id="rId10"/>
-    <p:sldId id="267" r:id="rId11"/>
-    <p:sldId id="268" r:id="rId12"/>
-    <p:sldId id="269" r:id="rId13"/>
-    <p:sldId id="270" r:id="rId14"/>
-    <p:sldId id="260" r:id="rId15"/>
+    <p:sldId id="271" r:id="rId4"/>
+    <p:sldId id="272" r:id="rId5"/>
+    <p:sldId id="258" r:id="rId6"/>
+    <p:sldId id="273" r:id="rId7"/>
+    <p:sldId id="274" r:id="rId8"/>
+    <p:sldId id="275" r:id="rId9"/>
+    <p:sldId id="276" r:id="rId10"/>
+    <p:sldId id="262" r:id="rId11"/>
+    <p:sldId id="263" r:id="rId12"/>
+    <p:sldId id="259" r:id="rId13"/>
+    <p:sldId id="277" r:id="rId14"/>
+    <p:sldId id="265" r:id="rId15"/>
+    <p:sldId id="266" r:id="rId16"/>
+    <p:sldId id="267" r:id="rId17"/>
+    <p:sldId id="268" r:id="rId18"/>
+    <p:sldId id="269" r:id="rId19"/>
+    <p:sldId id="278" r:id="rId20"/>
+    <p:sldId id="270" r:id="rId21"/>
+    <p:sldId id="260" r:id="rId22"/>
   </p:sldIdLst>
   <p:sldSz cx="12192000" cy="6858000"/>
   <p:notesSz cx="6858000" cy="9144000"/>
@@ -117,6 +124,11 @@
       </a:defRPr>
     </a:lvl9pPr>
   </p:defaultTextStyle>
+  <p:extLst>
+    <p:ext uri="{EFAFB233-063F-42B5-8137-9DF3F51BA10A}">
+      <p15:sldGuideLst xmlns:p15="http://schemas.microsoft.com/office/powerpoint/2012/main"/>
+    </p:ext>
+  </p:extLst>
 </p:presentation>
 </file>
 
@@ -251,7 +263,7 @@
           <a:p>
             <a:fld id="{5EE14A2A-CBD6-424A-96F5-04CD6568CBC4}" type="datetimeFigureOut">
               <a:rPr lang="ru-RU" smtClean="0"/>
-              <a:t>29.06.2022</a:t>
+              <a:t>30.06.2022</a:t>
             </a:fld>
             <a:endParaRPr lang="ru-RU"/>
           </a:p>
@@ -421,7 +433,7 @@
           <a:p>
             <a:fld id="{5EE14A2A-CBD6-424A-96F5-04CD6568CBC4}" type="datetimeFigureOut">
               <a:rPr lang="ru-RU" smtClean="0"/>
-              <a:t>29.06.2022</a:t>
+              <a:t>30.06.2022</a:t>
             </a:fld>
             <a:endParaRPr lang="ru-RU"/>
           </a:p>
@@ -601,7 +613,7 @@
           <a:p>
             <a:fld id="{5EE14A2A-CBD6-424A-96F5-04CD6568CBC4}" type="datetimeFigureOut">
               <a:rPr lang="ru-RU" smtClean="0"/>
-              <a:t>29.06.2022</a:t>
+              <a:t>30.06.2022</a:t>
             </a:fld>
             <a:endParaRPr lang="ru-RU"/>
           </a:p>
@@ -771,7 +783,7 @@
           <a:p>
             <a:fld id="{5EE14A2A-CBD6-424A-96F5-04CD6568CBC4}" type="datetimeFigureOut">
               <a:rPr lang="ru-RU" smtClean="0"/>
-              <a:t>29.06.2022</a:t>
+              <a:t>30.06.2022</a:t>
             </a:fld>
             <a:endParaRPr lang="ru-RU"/>
           </a:p>
@@ -1017,7 +1029,7 @@
           <a:p>
             <a:fld id="{5EE14A2A-CBD6-424A-96F5-04CD6568CBC4}" type="datetimeFigureOut">
               <a:rPr lang="ru-RU" smtClean="0"/>
-              <a:t>29.06.2022</a:t>
+              <a:t>30.06.2022</a:t>
             </a:fld>
             <a:endParaRPr lang="ru-RU"/>
           </a:p>
@@ -1249,7 +1261,7 @@
           <a:p>
             <a:fld id="{5EE14A2A-CBD6-424A-96F5-04CD6568CBC4}" type="datetimeFigureOut">
               <a:rPr lang="ru-RU" smtClean="0"/>
-              <a:t>29.06.2022</a:t>
+              <a:t>30.06.2022</a:t>
             </a:fld>
             <a:endParaRPr lang="ru-RU"/>
           </a:p>
@@ -1616,7 +1628,7 @@
           <a:p>
             <a:fld id="{5EE14A2A-CBD6-424A-96F5-04CD6568CBC4}" type="datetimeFigureOut">
               <a:rPr lang="ru-RU" smtClean="0"/>
-              <a:t>29.06.2022</a:t>
+              <a:t>30.06.2022</a:t>
             </a:fld>
             <a:endParaRPr lang="ru-RU"/>
           </a:p>
@@ -1734,7 +1746,7 @@
           <a:p>
             <a:fld id="{5EE14A2A-CBD6-424A-96F5-04CD6568CBC4}" type="datetimeFigureOut">
               <a:rPr lang="ru-RU" smtClean="0"/>
-              <a:t>29.06.2022</a:t>
+              <a:t>30.06.2022</a:t>
             </a:fld>
             <a:endParaRPr lang="ru-RU"/>
           </a:p>
@@ -1829,7 +1841,7 @@
           <a:p>
             <a:fld id="{5EE14A2A-CBD6-424A-96F5-04CD6568CBC4}" type="datetimeFigureOut">
               <a:rPr lang="ru-RU" smtClean="0"/>
-              <a:t>29.06.2022</a:t>
+              <a:t>30.06.2022</a:t>
             </a:fld>
             <a:endParaRPr lang="ru-RU"/>
           </a:p>
@@ -2106,7 +2118,7 @@
           <a:p>
             <a:fld id="{5EE14A2A-CBD6-424A-96F5-04CD6568CBC4}" type="datetimeFigureOut">
               <a:rPr lang="ru-RU" smtClean="0"/>
-              <a:t>29.06.2022</a:t>
+              <a:t>30.06.2022</a:t>
             </a:fld>
             <a:endParaRPr lang="ru-RU"/>
           </a:p>
@@ -2359,7 +2371,7 @@
           <a:p>
             <a:fld id="{5EE14A2A-CBD6-424A-96F5-04CD6568CBC4}" type="datetimeFigureOut">
               <a:rPr lang="ru-RU" smtClean="0"/>
-              <a:t>29.06.2022</a:t>
+              <a:t>30.06.2022</a:t>
             </a:fld>
             <a:endParaRPr lang="ru-RU"/>
           </a:p>
@@ -2572,7 +2584,7 @@
           <a:p>
             <a:fld id="{5EE14A2A-CBD6-424A-96F5-04CD6568CBC4}" type="datetimeFigureOut">
               <a:rPr lang="ru-RU" smtClean="0"/>
-              <a:t>29.06.2022</a:t>
+              <a:t>30.06.2022</a:t>
             </a:fld>
             <a:endParaRPr lang="ru-RU"/>
           </a:p>
@@ -3051,760 +3063,6 @@
       </p:grpSpPr>
       <p:pic>
         <p:nvPicPr>
-          <p:cNvPr id="5122" name="Picture 2" descr="https://latex2png.com/pngs/234ab60adf9b02e28605280f287f39fa.png"/>
-          <p:cNvPicPr>
-            <a:picLocks noChangeAspect="1" noChangeArrowheads="1"/>
-          </p:cNvPicPr>
-          <p:nvPr/>
-        </p:nvPicPr>
-        <p:blipFill>
-          <a:blip r:embed="rId2">
-            <a:extLst>
-              <a:ext uri="{28A0092B-C50C-407E-A947-70E740481C1C}">
-                <a14:useLocalDpi xmlns:a14="http://schemas.microsoft.com/office/drawing/2010/main" val="0"/>
-              </a:ext>
-            </a:extLst>
-          </a:blip>
-          <a:srcRect/>
-          <a:stretch>
-            <a:fillRect/>
-          </a:stretch>
-        </p:blipFill>
-        <p:spPr bwMode="auto">
-          <a:xfrm>
-            <a:off x="0" y="2634777"/>
-            <a:ext cx="12811125" cy="866776"/>
-          </a:xfrm>
-          <a:prstGeom prst="rect">
-            <a:avLst/>
-          </a:prstGeom>
-          <a:noFill/>
-          <a:extLst>
-            <a:ext uri="{909E8E84-426E-40DD-AFC4-6F175D3DCCD1}">
-              <a14:hiddenFill xmlns:a14="http://schemas.microsoft.com/office/drawing/2010/main">
-                <a:solidFill>
-                  <a:srgbClr val="FFFFFF"/>
-                </a:solidFill>
-              </a14:hiddenFill>
-            </a:ext>
-          </a:extLst>
-        </p:spPr>
-      </p:pic>
-    </p:spTree>
-    <p:extLst>
-      <p:ext uri="{BB962C8B-B14F-4D97-AF65-F5344CB8AC3E}">
-        <p14:creationId xmlns:p14="http://schemas.microsoft.com/office/powerpoint/2010/main" val="1963097380"/>
-      </p:ext>
-    </p:extLst>
-  </p:cSld>
-  <p:clrMapOvr>
-    <a:masterClrMapping/>
-  </p:clrMapOvr>
-</p:sld>
-</file>
-
-<file path=ppt/slides/slide11.xml><?xml version="1.0" encoding="utf-8"?>
-<p:sld xmlns:a="http://schemas.openxmlformats.org/drawingml/2006/main" xmlns:r="http://schemas.openxmlformats.org/officeDocument/2006/relationships" xmlns:p="http://schemas.openxmlformats.org/presentationml/2006/main">
-  <p:cSld>
-    <p:spTree>
-      <p:nvGrpSpPr>
-        <p:cNvPr id="1" name=""/>
-        <p:cNvGrpSpPr/>
-        <p:nvPr/>
-      </p:nvGrpSpPr>
-      <p:grpSpPr>
-        <a:xfrm>
-          <a:off x="0" y="0"/>
-          <a:ext cx="0" cy="0"/>
-          <a:chOff x="0" y="0"/>
-          <a:chExt cx="0" cy="0"/>
-        </a:xfrm>
-      </p:grpSpPr>
-      <p:sp>
-        <p:nvSpPr>
-          <p:cNvPr id="2" name="Заголовок 1"/>
-          <p:cNvSpPr>
-            <a:spLocks noGrp="1"/>
-          </p:cNvSpPr>
-          <p:nvPr>
-            <p:ph type="title"/>
-          </p:nvPr>
-        </p:nvSpPr>
-        <p:spPr/>
-        <p:txBody>
-          <a:bodyPr/>
-          <a:lstStyle/>
-          <a:p>
-            <a:endParaRPr lang="ru-RU"/>
-          </a:p>
-        </p:txBody>
-      </p:sp>
-      <p:sp>
-        <p:nvSpPr>
-          <p:cNvPr id="3" name="Объект 2"/>
-          <p:cNvSpPr>
-            <a:spLocks noGrp="1"/>
-          </p:cNvSpPr>
-          <p:nvPr>
-            <p:ph idx="1"/>
-          </p:nvPr>
-        </p:nvSpPr>
-        <p:spPr/>
-        <p:txBody>
-          <a:bodyPr/>
-          <a:lstStyle/>
-          <a:p>
-            <a:endParaRPr lang="ru-RU"/>
-          </a:p>
-        </p:txBody>
-      </p:sp>
-      <p:pic>
-        <p:nvPicPr>
-          <p:cNvPr id="6146" name="Picture 2" descr="https://latex2png.com/pngs/13e67c1ea24a851449c3f6240d70d2d3.png"/>
-          <p:cNvPicPr>
-            <a:picLocks noChangeAspect="1" noChangeArrowheads="1"/>
-          </p:cNvPicPr>
-          <p:nvPr/>
-        </p:nvPicPr>
-        <p:blipFill>
-          <a:blip r:embed="rId2">
-            <a:extLst>
-              <a:ext uri="{28A0092B-C50C-407E-A947-70E740481C1C}">
-                <a14:useLocalDpi xmlns:a14="http://schemas.microsoft.com/office/drawing/2010/main" val="0"/>
-              </a:ext>
-            </a:extLst>
-          </a:blip>
-          <a:srcRect/>
-          <a:stretch>
-            <a:fillRect/>
-          </a:stretch>
-        </p:blipFill>
-        <p:spPr bwMode="auto">
-          <a:xfrm>
-            <a:off x="0" y="2988145"/>
-            <a:ext cx="13049250" cy="790576"/>
-          </a:xfrm>
-          <a:prstGeom prst="rect">
-            <a:avLst/>
-          </a:prstGeom>
-          <a:noFill/>
-          <a:extLst>
-            <a:ext uri="{909E8E84-426E-40DD-AFC4-6F175D3DCCD1}">
-              <a14:hiddenFill xmlns:a14="http://schemas.microsoft.com/office/drawing/2010/main">
-                <a:solidFill>
-                  <a:srgbClr val="FFFFFF"/>
-                </a:solidFill>
-              </a14:hiddenFill>
-            </a:ext>
-          </a:extLst>
-        </p:spPr>
-      </p:pic>
-    </p:spTree>
-    <p:extLst>
-      <p:ext uri="{BB962C8B-B14F-4D97-AF65-F5344CB8AC3E}">
-        <p14:creationId xmlns:p14="http://schemas.microsoft.com/office/powerpoint/2010/main" val="3305906431"/>
-      </p:ext>
-    </p:extLst>
-  </p:cSld>
-  <p:clrMapOvr>
-    <a:masterClrMapping/>
-  </p:clrMapOvr>
-</p:sld>
-</file>
-
-<file path=ppt/slides/slide12.xml><?xml version="1.0" encoding="utf-8"?>
-<p:sld xmlns:a="http://schemas.openxmlformats.org/drawingml/2006/main" xmlns:r="http://schemas.openxmlformats.org/officeDocument/2006/relationships" xmlns:p="http://schemas.openxmlformats.org/presentationml/2006/main">
-  <p:cSld>
-    <p:spTree>
-      <p:nvGrpSpPr>
-        <p:cNvPr id="1" name=""/>
-        <p:cNvGrpSpPr/>
-        <p:nvPr/>
-      </p:nvGrpSpPr>
-      <p:grpSpPr>
-        <a:xfrm>
-          <a:off x="0" y="0"/>
-          <a:ext cx="0" cy="0"/>
-          <a:chOff x="0" y="0"/>
-          <a:chExt cx="0" cy="0"/>
-        </a:xfrm>
-      </p:grpSpPr>
-      <p:sp>
-        <p:nvSpPr>
-          <p:cNvPr id="2" name="Заголовок 1"/>
-          <p:cNvSpPr>
-            <a:spLocks noGrp="1"/>
-          </p:cNvSpPr>
-          <p:nvPr>
-            <p:ph type="title"/>
-          </p:nvPr>
-        </p:nvSpPr>
-        <p:spPr/>
-        <p:txBody>
-          <a:bodyPr/>
-          <a:lstStyle/>
-          <a:p>
-            <a:endParaRPr lang="ru-RU"/>
-          </a:p>
-        </p:txBody>
-      </p:sp>
-      <p:sp>
-        <p:nvSpPr>
-          <p:cNvPr id="3" name="Объект 2"/>
-          <p:cNvSpPr>
-            <a:spLocks noGrp="1"/>
-          </p:cNvSpPr>
-          <p:nvPr>
-            <p:ph idx="1"/>
-          </p:nvPr>
-        </p:nvSpPr>
-        <p:spPr/>
-        <p:txBody>
-          <a:bodyPr/>
-          <a:lstStyle/>
-          <a:p>
-            <a:endParaRPr lang="ru-RU"/>
-          </a:p>
-        </p:txBody>
-      </p:sp>
-      <p:pic>
-        <p:nvPicPr>
-          <p:cNvPr id="7170" name="Picture 2" descr="https://latex2png.com/pngs/b05d484512d02527a72539d3c75635e7.png"/>
-          <p:cNvPicPr>
-            <a:picLocks noChangeAspect="1" noChangeArrowheads="1"/>
-          </p:cNvPicPr>
-          <p:nvPr/>
-        </p:nvPicPr>
-        <p:blipFill>
-          <a:blip r:embed="rId2">
-            <a:extLst>
-              <a:ext uri="{28A0092B-C50C-407E-A947-70E740481C1C}">
-                <a14:useLocalDpi xmlns:a14="http://schemas.microsoft.com/office/drawing/2010/main" val="0"/>
-              </a:ext>
-            </a:extLst>
-          </a:blip>
-          <a:srcRect/>
-          <a:stretch>
-            <a:fillRect/>
-          </a:stretch>
-        </p:blipFill>
-        <p:spPr bwMode="auto">
-          <a:xfrm>
-            <a:off x="1147762" y="2647983"/>
-            <a:ext cx="9896475" cy="1619251"/>
-          </a:xfrm>
-          <a:prstGeom prst="rect">
-            <a:avLst/>
-          </a:prstGeom>
-          <a:noFill/>
-          <a:extLst>
-            <a:ext uri="{909E8E84-426E-40DD-AFC4-6F175D3DCCD1}">
-              <a14:hiddenFill xmlns:a14="http://schemas.microsoft.com/office/drawing/2010/main">
-                <a:solidFill>
-                  <a:srgbClr val="FFFFFF"/>
-                </a:solidFill>
-              </a14:hiddenFill>
-            </a:ext>
-          </a:extLst>
-        </p:spPr>
-      </p:pic>
-    </p:spTree>
-    <p:extLst>
-      <p:ext uri="{BB962C8B-B14F-4D97-AF65-F5344CB8AC3E}">
-        <p14:creationId xmlns:p14="http://schemas.microsoft.com/office/powerpoint/2010/main" val="3857776915"/>
-      </p:ext>
-    </p:extLst>
-  </p:cSld>
-  <p:clrMapOvr>
-    <a:masterClrMapping/>
-  </p:clrMapOvr>
-</p:sld>
-</file>
-
-<file path=ppt/slides/slide13.xml><?xml version="1.0" encoding="utf-8"?>
-<p:sld xmlns:a="http://schemas.openxmlformats.org/drawingml/2006/main" xmlns:r="http://schemas.openxmlformats.org/officeDocument/2006/relationships" xmlns:p="http://schemas.openxmlformats.org/presentationml/2006/main">
-  <p:cSld>
-    <p:spTree>
-      <p:nvGrpSpPr>
-        <p:cNvPr id="1" name=""/>
-        <p:cNvGrpSpPr/>
-        <p:nvPr/>
-      </p:nvGrpSpPr>
-      <p:grpSpPr>
-        <a:xfrm>
-          <a:off x="0" y="0"/>
-          <a:ext cx="0" cy="0"/>
-          <a:chOff x="0" y="0"/>
-          <a:chExt cx="0" cy="0"/>
-        </a:xfrm>
-      </p:grpSpPr>
-      <p:sp>
-        <p:nvSpPr>
-          <p:cNvPr id="2" name="Заголовок 1"/>
-          <p:cNvSpPr>
-            <a:spLocks noGrp="1"/>
-          </p:cNvSpPr>
-          <p:nvPr>
-            <p:ph type="title"/>
-          </p:nvPr>
-        </p:nvSpPr>
-        <p:spPr/>
-        <p:txBody>
-          <a:bodyPr/>
-          <a:lstStyle/>
-          <a:p>
-            <a:endParaRPr lang="ru-RU"/>
-          </a:p>
-        </p:txBody>
-      </p:sp>
-      <p:sp>
-        <p:nvSpPr>
-          <p:cNvPr id="3" name="Объект 2"/>
-          <p:cNvSpPr>
-            <a:spLocks noGrp="1"/>
-          </p:cNvSpPr>
-          <p:nvPr>
-            <p:ph idx="1"/>
-          </p:nvPr>
-        </p:nvSpPr>
-        <p:spPr/>
-        <p:txBody>
-          <a:bodyPr/>
-          <a:lstStyle/>
-          <a:p>
-            <a:endParaRPr lang="ru-RU"/>
-          </a:p>
-        </p:txBody>
-      </p:sp>
-      <p:pic>
-        <p:nvPicPr>
-          <p:cNvPr id="8194" name="Picture 2" descr="https://latex2png.com/pngs/d78d3d9fa92f891fc2527187b0224161.png"/>
-          <p:cNvPicPr>
-            <a:picLocks noChangeAspect="1" noChangeArrowheads="1"/>
-          </p:cNvPicPr>
-          <p:nvPr/>
-        </p:nvPicPr>
-        <p:blipFill>
-          <a:blip r:embed="rId2">
-            <a:extLst>
-              <a:ext uri="{28A0092B-C50C-407E-A947-70E740481C1C}">
-                <a14:useLocalDpi xmlns:a14="http://schemas.microsoft.com/office/drawing/2010/main" val="0"/>
-              </a:ext>
-            </a:extLst>
-          </a:blip>
-          <a:srcRect/>
-          <a:stretch>
-            <a:fillRect/>
-          </a:stretch>
-        </p:blipFill>
-        <p:spPr bwMode="auto">
-          <a:xfrm>
-            <a:off x="2171700" y="1027906"/>
-            <a:ext cx="7848600" cy="914401"/>
-          </a:xfrm>
-          <a:prstGeom prst="rect">
-            <a:avLst/>
-          </a:prstGeom>
-          <a:noFill/>
-          <a:extLst>
-            <a:ext uri="{909E8E84-426E-40DD-AFC4-6F175D3DCCD1}">
-              <a14:hiddenFill xmlns:a14="http://schemas.microsoft.com/office/drawing/2010/main">
-                <a:solidFill>
-                  <a:srgbClr val="FFFFFF"/>
-                </a:solidFill>
-              </a14:hiddenFill>
-            </a:ext>
-          </a:extLst>
-        </p:spPr>
-      </p:pic>
-      <p:pic>
-        <p:nvPicPr>
-          <p:cNvPr id="8196" name="Picture 4" descr="https://latex2png.com/pngs/f0c9b33dfed63ccbedda7c0eedd134d6.png"/>
-          <p:cNvPicPr>
-            <a:picLocks noChangeAspect="1" noChangeArrowheads="1"/>
-          </p:cNvPicPr>
-          <p:nvPr/>
-        </p:nvPicPr>
-        <p:blipFill>
-          <a:blip r:embed="rId3">
-            <a:extLst>
-              <a:ext uri="{28A0092B-C50C-407E-A947-70E740481C1C}">
-                <a14:useLocalDpi xmlns:a14="http://schemas.microsoft.com/office/drawing/2010/main" val="0"/>
-              </a:ext>
-            </a:extLst>
-          </a:blip>
-          <a:srcRect/>
-          <a:stretch>
-            <a:fillRect/>
-          </a:stretch>
-        </p:blipFill>
-        <p:spPr bwMode="auto">
-          <a:xfrm>
-            <a:off x="3524250" y="2512240"/>
-            <a:ext cx="5143500" cy="790576"/>
-          </a:xfrm>
-          <a:prstGeom prst="rect">
-            <a:avLst/>
-          </a:prstGeom>
-          <a:noFill/>
-          <a:extLst>
-            <a:ext uri="{909E8E84-426E-40DD-AFC4-6F175D3DCCD1}">
-              <a14:hiddenFill xmlns:a14="http://schemas.microsoft.com/office/drawing/2010/main">
-                <a:solidFill>
-                  <a:srgbClr val="FFFFFF"/>
-                </a:solidFill>
-              </a14:hiddenFill>
-            </a:ext>
-          </a:extLst>
-        </p:spPr>
-      </p:pic>
-      <p:pic>
-        <p:nvPicPr>
-          <p:cNvPr id="8200" name="Picture 8" descr="https://latex2png.com/pngs/8857c3b6c9198a1e3fe5be83e2f68053.png"/>
-          <p:cNvPicPr>
-            <a:picLocks noChangeAspect="1" noChangeArrowheads="1"/>
-          </p:cNvPicPr>
-          <p:nvPr/>
-        </p:nvPicPr>
-        <p:blipFill>
-          <a:blip r:embed="rId4">
-            <a:extLst>
-              <a:ext uri="{28A0092B-C50C-407E-A947-70E740481C1C}">
-                <a14:useLocalDpi xmlns:a14="http://schemas.microsoft.com/office/drawing/2010/main" val="0"/>
-              </a:ext>
-            </a:extLst>
-          </a:blip>
-          <a:srcRect/>
-          <a:stretch>
-            <a:fillRect/>
-          </a:stretch>
-        </p:blipFill>
-        <p:spPr bwMode="auto">
-          <a:xfrm>
-            <a:off x="3786187" y="3949313"/>
-            <a:ext cx="4619625" cy="790576"/>
-          </a:xfrm>
-          <a:prstGeom prst="rect">
-            <a:avLst/>
-          </a:prstGeom>
-          <a:noFill/>
-          <a:extLst>
-            <a:ext uri="{909E8E84-426E-40DD-AFC4-6F175D3DCCD1}">
-              <a14:hiddenFill xmlns:a14="http://schemas.microsoft.com/office/drawing/2010/main">
-                <a:solidFill>
-                  <a:srgbClr val="FFFFFF"/>
-                </a:solidFill>
-              </a14:hiddenFill>
-            </a:ext>
-          </a:extLst>
-        </p:spPr>
-      </p:pic>
-    </p:spTree>
-    <p:extLst>
-      <p:ext uri="{BB962C8B-B14F-4D97-AF65-F5344CB8AC3E}">
-        <p14:creationId xmlns:p14="http://schemas.microsoft.com/office/powerpoint/2010/main" val="1028885119"/>
-      </p:ext>
-    </p:extLst>
-  </p:cSld>
-  <p:clrMapOvr>
-    <a:masterClrMapping/>
-  </p:clrMapOvr>
-</p:sld>
-</file>
-
-<file path=ppt/slides/slide14.xml><?xml version="1.0" encoding="utf-8"?>
-<p:sld xmlns:a="http://schemas.openxmlformats.org/drawingml/2006/main" xmlns:r="http://schemas.openxmlformats.org/officeDocument/2006/relationships" xmlns:p="http://schemas.openxmlformats.org/presentationml/2006/main">
-  <p:cSld>
-    <p:spTree>
-      <p:nvGrpSpPr>
-        <p:cNvPr id="1" name=""/>
-        <p:cNvGrpSpPr/>
-        <p:nvPr/>
-      </p:nvGrpSpPr>
-      <p:grpSpPr>
-        <a:xfrm>
-          <a:off x="0" y="0"/>
-          <a:ext cx="0" cy="0"/>
-          <a:chOff x="0" y="0"/>
-          <a:chExt cx="0" cy="0"/>
-        </a:xfrm>
-      </p:grpSpPr>
-      <p:sp>
-        <p:nvSpPr>
-          <p:cNvPr id="2" name="Заголовок 1"/>
-          <p:cNvSpPr>
-            <a:spLocks noGrp="1"/>
-          </p:cNvSpPr>
-          <p:nvPr>
-            <p:ph type="ctrTitle"/>
-          </p:nvPr>
-        </p:nvSpPr>
-        <p:spPr/>
-        <p:txBody>
-          <a:bodyPr/>
-          <a:lstStyle/>
-          <a:p>
-            <a:r>
-              <a:rPr lang="ru-RU" dirty="0" smtClean="0"/>
-              <a:t>Видео 4</a:t>
-            </a:r>
-            <a:endParaRPr lang="ru-RU" dirty="0"/>
-          </a:p>
-        </p:txBody>
-      </p:sp>
-      <p:sp>
-        <p:nvSpPr>
-          <p:cNvPr id="3" name="Подзаголовок 2"/>
-          <p:cNvSpPr>
-            <a:spLocks noGrp="1"/>
-          </p:cNvSpPr>
-          <p:nvPr>
-            <p:ph type="subTitle" idx="1"/>
-          </p:nvPr>
-        </p:nvSpPr>
-        <p:spPr/>
-        <p:txBody>
-          <a:bodyPr/>
-          <a:lstStyle/>
-          <a:p>
-            <a:endParaRPr lang="ru-RU"/>
-          </a:p>
-        </p:txBody>
-      </p:sp>
-    </p:spTree>
-    <p:extLst>
-      <p:ext uri="{BB962C8B-B14F-4D97-AF65-F5344CB8AC3E}">
-        <p14:creationId xmlns:p14="http://schemas.microsoft.com/office/powerpoint/2010/main" val="3433073981"/>
-      </p:ext>
-    </p:extLst>
-  </p:cSld>
-  <p:clrMapOvr>
-    <a:masterClrMapping/>
-  </p:clrMapOvr>
-</p:sld>
-</file>
-
-<file path=ppt/slides/slide2.xml><?xml version="1.0" encoding="utf-8"?>
-<p:sld xmlns:a="http://schemas.openxmlformats.org/drawingml/2006/main" xmlns:r="http://schemas.openxmlformats.org/officeDocument/2006/relationships" xmlns:p="http://schemas.openxmlformats.org/presentationml/2006/main">
-  <p:cSld>
-    <p:spTree>
-      <p:nvGrpSpPr>
-        <p:cNvPr id="1" name=""/>
-        <p:cNvGrpSpPr/>
-        <p:nvPr/>
-      </p:nvGrpSpPr>
-      <p:grpSpPr>
-        <a:xfrm>
-          <a:off x="0" y="0"/>
-          <a:ext cx="0" cy="0"/>
-          <a:chOff x="0" y="0"/>
-          <a:chExt cx="0" cy="0"/>
-        </a:xfrm>
-      </p:grpSpPr>
-      <p:sp>
-        <p:nvSpPr>
-          <p:cNvPr id="2" name="Заголовок 1"/>
-          <p:cNvSpPr>
-            <a:spLocks noGrp="1"/>
-          </p:cNvSpPr>
-          <p:nvPr>
-            <p:ph type="ctrTitle"/>
-          </p:nvPr>
-        </p:nvSpPr>
-        <p:spPr/>
-        <p:txBody>
-          <a:bodyPr/>
-          <a:lstStyle/>
-          <a:p>
-            <a:r>
-              <a:rPr lang="ru-RU" dirty="0" smtClean="0"/>
-              <a:t>Видео 1</a:t>
-            </a:r>
-            <a:endParaRPr lang="ru-RU" dirty="0"/>
-          </a:p>
-        </p:txBody>
-      </p:sp>
-      <p:sp>
-        <p:nvSpPr>
-          <p:cNvPr id="3" name="Подзаголовок 2"/>
-          <p:cNvSpPr>
-            <a:spLocks noGrp="1"/>
-          </p:cNvSpPr>
-          <p:nvPr>
-            <p:ph type="subTitle" idx="1"/>
-          </p:nvPr>
-        </p:nvSpPr>
-        <p:spPr/>
-        <p:txBody>
-          <a:bodyPr/>
-          <a:lstStyle/>
-          <a:p>
-            <a:endParaRPr lang="ru-RU"/>
-          </a:p>
-        </p:txBody>
-      </p:sp>
-    </p:spTree>
-    <p:extLst>
-      <p:ext uri="{BB962C8B-B14F-4D97-AF65-F5344CB8AC3E}">
-        <p14:creationId xmlns:p14="http://schemas.microsoft.com/office/powerpoint/2010/main" val="3006925586"/>
-      </p:ext>
-    </p:extLst>
-  </p:cSld>
-  <p:clrMapOvr>
-    <a:masterClrMapping/>
-  </p:clrMapOvr>
-</p:sld>
-</file>
-
-<file path=ppt/slides/slide3.xml><?xml version="1.0" encoding="utf-8"?>
-<p:sld xmlns:a="http://schemas.openxmlformats.org/drawingml/2006/main" xmlns:r="http://schemas.openxmlformats.org/officeDocument/2006/relationships" xmlns:p="http://schemas.openxmlformats.org/presentationml/2006/main">
-  <p:cSld>
-    <p:spTree>
-      <p:nvGrpSpPr>
-        <p:cNvPr id="1" name=""/>
-        <p:cNvGrpSpPr/>
-        <p:nvPr/>
-      </p:nvGrpSpPr>
-      <p:grpSpPr>
-        <a:xfrm>
-          <a:off x="0" y="0"/>
-          <a:ext cx="0" cy="0"/>
-          <a:chOff x="0" y="0"/>
-          <a:chExt cx="0" cy="0"/>
-        </a:xfrm>
-      </p:grpSpPr>
-      <p:sp>
-        <p:nvSpPr>
-          <p:cNvPr id="2" name="Заголовок 1"/>
-          <p:cNvSpPr>
-            <a:spLocks noGrp="1"/>
-          </p:cNvSpPr>
-          <p:nvPr>
-            <p:ph type="ctrTitle"/>
-          </p:nvPr>
-        </p:nvSpPr>
-        <p:spPr/>
-        <p:txBody>
-          <a:bodyPr/>
-          <a:lstStyle/>
-          <a:p>
-            <a:r>
-              <a:rPr lang="ru-RU" dirty="0" smtClean="0"/>
-              <a:t>Видео 2</a:t>
-            </a:r>
-            <a:endParaRPr lang="ru-RU" dirty="0"/>
-          </a:p>
-        </p:txBody>
-      </p:sp>
-      <p:sp>
-        <p:nvSpPr>
-          <p:cNvPr id="3" name="Подзаголовок 2"/>
-          <p:cNvSpPr>
-            <a:spLocks noGrp="1"/>
-          </p:cNvSpPr>
-          <p:nvPr>
-            <p:ph type="subTitle" idx="1"/>
-          </p:nvPr>
-        </p:nvSpPr>
-        <p:spPr/>
-        <p:txBody>
-          <a:bodyPr/>
-          <a:lstStyle/>
-          <a:p>
-            <a:endParaRPr lang="ru-RU"/>
-          </a:p>
-        </p:txBody>
-      </p:sp>
-    </p:spTree>
-    <p:extLst>
-      <p:ext uri="{BB962C8B-B14F-4D97-AF65-F5344CB8AC3E}">
-        <p14:creationId xmlns:p14="http://schemas.microsoft.com/office/powerpoint/2010/main" val="1086063279"/>
-      </p:ext>
-    </p:extLst>
-  </p:cSld>
-  <p:clrMapOvr>
-    <a:masterClrMapping/>
-  </p:clrMapOvr>
-</p:sld>
-</file>
-
-<file path=ppt/slides/slide4.xml><?xml version="1.0" encoding="utf-8"?>
-<p:sld xmlns:a="http://schemas.openxmlformats.org/drawingml/2006/main" xmlns:r="http://schemas.openxmlformats.org/officeDocument/2006/relationships" xmlns:p="http://schemas.openxmlformats.org/presentationml/2006/main">
-  <p:cSld>
-    <p:spTree>
-      <p:nvGrpSpPr>
-        <p:cNvPr id="1" name=""/>
-        <p:cNvGrpSpPr/>
-        <p:nvPr/>
-      </p:nvGrpSpPr>
-      <p:grpSpPr>
-        <a:xfrm>
-          <a:off x="0" y="0"/>
-          <a:ext cx="0" cy="0"/>
-          <a:chOff x="0" y="0"/>
-          <a:chExt cx="0" cy="0"/>
-        </a:xfrm>
-      </p:grpSpPr>
-      <p:sp>
-        <p:nvSpPr>
-          <p:cNvPr id="2" name="Заголовок 1"/>
-          <p:cNvSpPr>
-            <a:spLocks noGrp="1"/>
-          </p:cNvSpPr>
-          <p:nvPr>
-            <p:ph type="title"/>
-          </p:nvPr>
-        </p:nvSpPr>
-        <p:spPr>
-          <a:xfrm>
-            <a:off x="708454" y="3009471"/>
-            <a:ext cx="10515600" cy="1325563"/>
-          </a:xfrm>
-        </p:spPr>
-        <p:txBody>
-          <a:bodyPr/>
-          <a:lstStyle/>
-          <a:p>
-            <a:r>
-              <a:rPr lang="ru-RU" b="1" dirty="0" smtClean="0"/>
-              <a:t>ДОБАВИТЬ ПОЯСНЯЛКИ ПО ПЕРВОЙ ЗАДАЧЕ</a:t>
-            </a:r>
-            <a:endParaRPr lang="ru-RU" b="1" dirty="0"/>
-          </a:p>
-        </p:txBody>
-      </p:sp>
-    </p:spTree>
-    <p:extLst>
-      <p:ext uri="{BB962C8B-B14F-4D97-AF65-F5344CB8AC3E}">
-        <p14:creationId xmlns:p14="http://schemas.microsoft.com/office/powerpoint/2010/main" val="1984467169"/>
-      </p:ext>
-    </p:extLst>
-  </p:cSld>
-  <p:clrMapOvr>
-    <a:masterClrMapping/>
-  </p:clrMapOvr>
-</p:sld>
-</file>
-
-<file path=ppt/slides/slide5.xml><?xml version="1.0" encoding="utf-8"?>
-<p:sld xmlns:a="http://schemas.openxmlformats.org/drawingml/2006/main" xmlns:r="http://schemas.openxmlformats.org/officeDocument/2006/relationships" xmlns:p="http://schemas.openxmlformats.org/presentationml/2006/main">
-  <p:cSld>
-    <p:spTree>
-      <p:nvGrpSpPr>
-        <p:cNvPr id="1" name=""/>
-        <p:cNvGrpSpPr/>
-        <p:nvPr/>
-      </p:nvGrpSpPr>
-      <p:grpSpPr>
-        <a:xfrm>
-          <a:off x="0" y="0"/>
-          <a:ext cx="0" cy="0"/>
-          <a:chOff x="0" y="0"/>
-          <a:chExt cx="0" cy="0"/>
-        </a:xfrm>
-      </p:grpSpPr>
-      <p:pic>
-        <p:nvPicPr>
           <p:cNvPr id="1026" name="Picture 2" descr="https://latex2png.com/pngs/d84209407826a6f2b802deef3606f0c5.png"/>
           <p:cNvPicPr>
             <a:picLocks noChangeAspect="1" noChangeArrowheads="1"/>
@@ -3898,7 +3156,7 @@
 </p:sld>
 </file>
 
-<file path=ppt/slides/slide6.xml><?xml version="1.0" encoding="utf-8"?>
+<file path=ppt/slides/slide11.xml><?xml version="1.0" encoding="utf-8"?>
 <p:sld xmlns:a="http://schemas.openxmlformats.org/drawingml/2006/main" xmlns:r="http://schemas.openxmlformats.org/officeDocument/2006/relationships" xmlns:p="http://schemas.openxmlformats.org/presentationml/2006/main">
   <p:cSld>
     <p:spTree>
@@ -4010,7 +3268,7 @@
 </p:sld>
 </file>
 
-<file path=ppt/slides/slide7.xml><?xml version="1.0" encoding="utf-8"?>
+<file path=ppt/slides/slide12.xml><?xml version="1.0" encoding="utf-8"?>
 <p:sld xmlns:a="http://schemas.openxmlformats.org/drawingml/2006/main" xmlns:r="http://schemas.openxmlformats.org/officeDocument/2006/relationships" xmlns:p="http://schemas.openxmlformats.org/presentationml/2006/main">
   <p:cSld>
     <p:spTree>
@@ -4082,7 +3340,95 @@
 </p:sld>
 </file>
 
-<file path=ppt/slides/slide8.xml><?xml version="1.0" encoding="utf-8"?>
+<file path=ppt/slides/slide13.xml><?xml version="1.0" encoding="utf-8"?>
+<p:sld xmlns:a="http://schemas.openxmlformats.org/drawingml/2006/main" xmlns:r="http://schemas.openxmlformats.org/officeDocument/2006/relationships" xmlns:p="http://schemas.openxmlformats.org/presentationml/2006/main">
+  <p:cSld>
+    <p:spTree>
+      <p:nvGrpSpPr>
+        <p:cNvPr id="1" name=""/>
+        <p:cNvGrpSpPr/>
+        <p:nvPr/>
+      </p:nvGrpSpPr>
+      <p:grpSpPr>
+        <a:xfrm>
+          <a:off x="0" y="0"/>
+          <a:ext cx="0" cy="0"/>
+          <a:chOff x="0" y="0"/>
+          <a:chExt cx="0" cy="0"/>
+        </a:xfrm>
+      </p:grpSpPr>
+      <p:sp>
+        <p:nvSpPr>
+          <p:cNvPr id="2" name="Заголовок 1"/>
+          <p:cNvSpPr>
+            <a:spLocks noGrp="1"/>
+          </p:cNvSpPr>
+          <p:nvPr>
+            <p:ph type="title"/>
+          </p:nvPr>
+        </p:nvSpPr>
+        <p:spPr/>
+        <p:txBody>
+          <a:bodyPr/>
+          <a:lstStyle/>
+          <a:p>
+            <a:r>
+              <a:rPr lang="ru-RU" dirty="0" smtClean="0"/>
+              <a:t>Условие задачи 1</a:t>
+            </a:r>
+            <a:endParaRPr lang="ru-RU" dirty="0"/>
+          </a:p>
+        </p:txBody>
+      </p:sp>
+      <p:sp>
+        <p:nvSpPr>
+          <p:cNvPr id="3" name="Объект 2"/>
+          <p:cNvSpPr>
+            <a:spLocks noGrp="1"/>
+          </p:cNvSpPr>
+          <p:nvPr>
+            <p:ph idx="1"/>
+          </p:nvPr>
+        </p:nvSpPr>
+        <p:spPr/>
+        <p:txBody>
+          <a:bodyPr/>
+          <a:lstStyle/>
+          <a:p>
+            <a:r>
+              <a:rPr lang="ru-RU" dirty="0"/>
+              <a:t>Среди определенной группы людей вероятность заболеть </a:t>
+            </a:r>
+            <a:r>
+              <a:rPr lang="ru-RU" dirty="0" err="1"/>
+              <a:t>коронавирусом</a:t>
+            </a:r>
+            <a:r>
+              <a:rPr lang="ru-RU" dirty="0"/>
+              <a:t> 0.1. Тест позволяет выявить болезнь с вероятностью 0.98 на больных людях, но также он дает ложно-положительный результат с вероятностью 0.01. Найдите вероятность того, что человек, сдавший тест, действительно болен</a:t>
+            </a:r>
+            <a:r>
+              <a:rPr lang="ru-RU" dirty="0" smtClean="0"/>
+              <a:t>.</a:t>
+            </a:r>
+            <a:endParaRPr lang="ru-RU" dirty="0"/>
+          </a:p>
+        </p:txBody>
+      </p:sp>
+    </p:spTree>
+    <p:extLst>
+      <p:ext uri="{BB962C8B-B14F-4D97-AF65-F5344CB8AC3E}">
+        <p14:creationId xmlns:p14="http://schemas.microsoft.com/office/powerpoint/2010/main" val="3437100275"/>
+      </p:ext>
+    </p:extLst>
+  </p:cSld>
+  <p:clrMapOvr>
+    <a:masterClrMapping/>
+  </p:clrMapOvr>
+</p:sld>
+</file>
+
+<file path=ppt/slides/slide14.xml><?xml version="1.0" encoding="utf-8"?>
 <p:sld xmlns:a="http://schemas.openxmlformats.org/drawingml/2006/main" xmlns:r="http://schemas.openxmlformats.org/officeDocument/2006/relationships" xmlns:p="http://schemas.openxmlformats.org/presentationml/2006/main">
   <p:cSld>
     <p:spTree>
@@ -4235,7 +3581,7 @@
 </p:sld>
 </file>
 
-<file path=ppt/slides/slide9.xml><?xml version="1.0" encoding="utf-8"?>
+<file path=ppt/slides/slide15.xml><?xml version="1.0" encoding="utf-8"?>
 <p:sld xmlns:a="http://schemas.openxmlformats.org/drawingml/2006/main" xmlns:r="http://schemas.openxmlformats.org/officeDocument/2006/relationships" xmlns:p="http://schemas.openxmlformats.org/presentationml/2006/main">
   <p:cSld>
     <p:spTree>
@@ -4297,6 +3643,1697 @@
     <p:extLst>
       <p:ext uri="{BB962C8B-B14F-4D97-AF65-F5344CB8AC3E}">
         <p14:creationId xmlns:p14="http://schemas.microsoft.com/office/powerpoint/2010/main" val="4013142598"/>
+      </p:ext>
+    </p:extLst>
+  </p:cSld>
+  <p:clrMapOvr>
+    <a:masterClrMapping/>
+  </p:clrMapOvr>
+</p:sld>
+</file>
+
+<file path=ppt/slides/slide16.xml><?xml version="1.0" encoding="utf-8"?>
+<p:sld xmlns:a="http://schemas.openxmlformats.org/drawingml/2006/main" xmlns:r="http://schemas.openxmlformats.org/officeDocument/2006/relationships" xmlns:p="http://schemas.openxmlformats.org/presentationml/2006/main">
+  <p:cSld>
+    <p:spTree>
+      <p:nvGrpSpPr>
+        <p:cNvPr id="1" name=""/>
+        <p:cNvGrpSpPr/>
+        <p:nvPr/>
+      </p:nvGrpSpPr>
+      <p:grpSpPr>
+        <a:xfrm>
+          <a:off x="0" y="0"/>
+          <a:ext cx="0" cy="0"/>
+          <a:chOff x="0" y="0"/>
+          <a:chExt cx="0" cy="0"/>
+        </a:xfrm>
+      </p:grpSpPr>
+      <p:pic>
+        <p:nvPicPr>
+          <p:cNvPr id="5122" name="Picture 2" descr="https://latex2png.com/pngs/234ab60adf9b02e28605280f287f39fa.png"/>
+          <p:cNvPicPr>
+            <a:picLocks noChangeAspect="1" noChangeArrowheads="1"/>
+          </p:cNvPicPr>
+          <p:nvPr/>
+        </p:nvPicPr>
+        <p:blipFill>
+          <a:blip r:embed="rId2">
+            <a:extLst>
+              <a:ext uri="{28A0092B-C50C-407E-A947-70E740481C1C}">
+                <a14:useLocalDpi xmlns:a14="http://schemas.microsoft.com/office/drawing/2010/main" val="0"/>
+              </a:ext>
+            </a:extLst>
+          </a:blip>
+          <a:srcRect/>
+          <a:stretch>
+            <a:fillRect/>
+          </a:stretch>
+        </p:blipFill>
+        <p:spPr bwMode="auto">
+          <a:xfrm>
+            <a:off x="0" y="2634777"/>
+            <a:ext cx="12811125" cy="866776"/>
+          </a:xfrm>
+          <a:prstGeom prst="rect">
+            <a:avLst/>
+          </a:prstGeom>
+          <a:noFill/>
+          <a:extLst>
+            <a:ext uri="{909E8E84-426E-40DD-AFC4-6F175D3DCCD1}">
+              <a14:hiddenFill xmlns:a14="http://schemas.microsoft.com/office/drawing/2010/main">
+                <a:solidFill>
+                  <a:srgbClr val="FFFFFF"/>
+                </a:solidFill>
+              </a14:hiddenFill>
+            </a:ext>
+          </a:extLst>
+        </p:spPr>
+      </p:pic>
+    </p:spTree>
+    <p:extLst>
+      <p:ext uri="{BB962C8B-B14F-4D97-AF65-F5344CB8AC3E}">
+        <p14:creationId xmlns:p14="http://schemas.microsoft.com/office/powerpoint/2010/main" val="1963097380"/>
+      </p:ext>
+    </p:extLst>
+  </p:cSld>
+  <p:clrMapOvr>
+    <a:masterClrMapping/>
+  </p:clrMapOvr>
+</p:sld>
+</file>
+
+<file path=ppt/slides/slide17.xml><?xml version="1.0" encoding="utf-8"?>
+<p:sld xmlns:a="http://schemas.openxmlformats.org/drawingml/2006/main" xmlns:r="http://schemas.openxmlformats.org/officeDocument/2006/relationships" xmlns:p="http://schemas.openxmlformats.org/presentationml/2006/main">
+  <p:cSld>
+    <p:spTree>
+      <p:nvGrpSpPr>
+        <p:cNvPr id="1" name=""/>
+        <p:cNvGrpSpPr/>
+        <p:nvPr/>
+      </p:nvGrpSpPr>
+      <p:grpSpPr>
+        <a:xfrm>
+          <a:off x="0" y="0"/>
+          <a:ext cx="0" cy="0"/>
+          <a:chOff x="0" y="0"/>
+          <a:chExt cx="0" cy="0"/>
+        </a:xfrm>
+      </p:grpSpPr>
+      <p:sp>
+        <p:nvSpPr>
+          <p:cNvPr id="2" name="Заголовок 1"/>
+          <p:cNvSpPr>
+            <a:spLocks noGrp="1"/>
+          </p:cNvSpPr>
+          <p:nvPr>
+            <p:ph type="title"/>
+          </p:nvPr>
+        </p:nvSpPr>
+        <p:spPr/>
+        <p:txBody>
+          <a:bodyPr/>
+          <a:lstStyle/>
+          <a:p>
+            <a:endParaRPr lang="ru-RU"/>
+          </a:p>
+        </p:txBody>
+      </p:sp>
+      <p:sp>
+        <p:nvSpPr>
+          <p:cNvPr id="3" name="Объект 2"/>
+          <p:cNvSpPr>
+            <a:spLocks noGrp="1"/>
+          </p:cNvSpPr>
+          <p:nvPr>
+            <p:ph idx="1"/>
+          </p:nvPr>
+        </p:nvSpPr>
+        <p:spPr/>
+        <p:txBody>
+          <a:bodyPr/>
+          <a:lstStyle/>
+          <a:p>
+            <a:endParaRPr lang="ru-RU"/>
+          </a:p>
+        </p:txBody>
+      </p:sp>
+      <p:pic>
+        <p:nvPicPr>
+          <p:cNvPr id="6146" name="Picture 2" descr="https://latex2png.com/pngs/13e67c1ea24a851449c3f6240d70d2d3.png"/>
+          <p:cNvPicPr>
+            <a:picLocks noChangeAspect="1" noChangeArrowheads="1"/>
+          </p:cNvPicPr>
+          <p:nvPr/>
+        </p:nvPicPr>
+        <p:blipFill>
+          <a:blip r:embed="rId2">
+            <a:extLst>
+              <a:ext uri="{28A0092B-C50C-407E-A947-70E740481C1C}">
+                <a14:useLocalDpi xmlns:a14="http://schemas.microsoft.com/office/drawing/2010/main" val="0"/>
+              </a:ext>
+            </a:extLst>
+          </a:blip>
+          <a:srcRect/>
+          <a:stretch>
+            <a:fillRect/>
+          </a:stretch>
+        </p:blipFill>
+        <p:spPr bwMode="auto">
+          <a:xfrm>
+            <a:off x="-428625" y="2831735"/>
+            <a:ext cx="13049250" cy="790576"/>
+          </a:xfrm>
+          <a:prstGeom prst="rect">
+            <a:avLst/>
+          </a:prstGeom>
+          <a:noFill/>
+          <a:extLst>
+            <a:ext uri="{909E8E84-426E-40DD-AFC4-6F175D3DCCD1}">
+              <a14:hiddenFill xmlns:a14="http://schemas.microsoft.com/office/drawing/2010/main">
+                <a:solidFill>
+                  <a:srgbClr val="FFFFFF"/>
+                </a:solidFill>
+              </a14:hiddenFill>
+            </a:ext>
+          </a:extLst>
+        </p:spPr>
+      </p:pic>
+    </p:spTree>
+    <p:extLst>
+      <p:ext uri="{BB962C8B-B14F-4D97-AF65-F5344CB8AC3E}">
+        <p14:creationId xmlns:p14="http://schemas.microsoft.com/office/powerpoint/2010/main" val="3305906431"/>
+      </p:ext>
+    </p:extLst>
+  </p:cSld>
+  <p:clrMapOvr>
+    <a:masterClrMapping/>
+  </p:clrMapOvr>
+</p:sld>
+</file>
+
+<file path=ppt/slides/slide18.xml><?xml version="1.0" encoding="utf-8"?>
+<p:sld xmlns:a="http://schemas.openxmlformats.org/drawingml/2006/main" xmlns:r="http://schemas.openxmlformats.org/officeDocument/2006/relationships" xmlns:p="http://schemas.openxmlformats.org/presentationml/2006/main">
+  <p:cSld>
+    <p:spTree>
+      <p:nvGrpSpPr>
+        <p:cNvPr id="1" name=""/>
+        <p:cNvGrpSpPr/>
+        <p:nvPr/>
+      </p:nvGrpSpPr>
+      <p:grpSpPr>
+        <a:xfrm>
+          <a:off x="0" y="0"/>
+          <a:ext cx="0" cy="0"/>
+          <a:chOff x="0" y="0"/>
+          <a:chExt cx="0" cy="0"/>
+        </a:xfrm>
+      </p:grpSpPr>
+      <p:sp>
+        <p:nvSpPr>
+          <p:cNvPr id="2" name="Заголовок 1"/>
+          <p:cNvSpPr>
+            <a:spLocks noGrp="1"/>
+          </p:cNvSpPr>
+          <p:nvPr>
+            <p:ph type="title"/>
+          </p:nvPr>
+        </p:nvSpPr>
+        <p:spPr/>
+        <p:txBody>
+          <a:bodyPr/>
+          <a:lstStyle/>
+          <a:p>
+            <a:endParaRPr lang="ru-RU"/>
+          </a:p>
+        </p:txBody>
+      </p:sp>
+      <p:sp>
+        <p:nvSpPr>
+          <p:cNvPr id="3" name="Объект 2"/>
+          <p:cNvSpPr>
+            <a:spLocks noGrp="1"/>
+          </p:cNvSpPr>
+          <p:nvPr>
+            <p:ph idx="1"/>
+          </p:nvPr>
+        </p:nvSpPr>
+        <p:spPr/>
+        <p:txBody>
+          <a:bodyPr/>
+          <a:lstStyle/>
+          <a:p>
+            <a:endParaRPr lang="ru-RU"/>
+          </a:p>
+        </p:txBody>
+      </p:sp>
+      <p:pic>
+        <p:nvPicPr>
+          <p:cNvPr id="7170" name="Picture 2" descr="https://latex2png.com/pngs/b05d484512d02527a72539d3c75635e7.png"/>
+          <p:cNvPicPr>
+            <a:picLocks noChangeAspect="1" noChangeArrowheads="1"/>
+          </p:cNvPicPr>
+          <p:nvPr/>
+        </p:nvPicPr>
+        <p:blipFill>
+          <a:blip r:embed="rId2">
+            <a:extLst>
+              <a:ext uri="{28A0092B-C50C-407E-A947-70E740481C1C}">
+                <a14:useLocalDpi xmlns:a14="http://schemas.microsoft.com/office/drawing/2010/main" val="0"/>
+              </a:ext>
+            </a:extLst>
+          </a:blip>
+          <a:srcRect/>
+          <a:stretch>
+            <a:fillRect/>
+          </a:stretch>
+        </p:blipFill>
+        <p:spPr bwMode="auto">
+          <a:xfrm>
+            <a:off x="1147762" y="2647983"/>
+            <a:ext cx="9896475" cy="1619251"/>
+          </a:xfrm>
+          <a:prstGeom prst="rect">
+            <a:avLst/>
+          </a:prstGeom>
+          <a:noFill/>
+          <a:extLst>
+            <a:ext uri="{909E8E84-426E-40DD-AFC4-6F175D3DCCD1}">
+              <a14:hiddenFill xmlns:a14="http://schemas.microsoft.com/office/drawing/2010/main">
+                <a:solidFill>
+                  <a:srgbClr val="FFFFFF"/>
+                </a:solidFill>
+              </a14:hiddenFill>
+            </a:ext>
+          </a:extLst>
+        </p:spPr>
+      </p:pic>
+    </p:spTree>
+    <p:extLst>
+      <p:ext uri="{BB962C8B-B14F-4D97-AF65-F5344CB8AC3E}">
+        <p14:creationId xmlns:p14="http://schemas.microsoft.com/office/powerpoint/2010/main" val="3857776915"/>
+      </p:ext>
+    </p:extLst>
+  </p:cSld>
+  <p:clrMapOvr>
+    <a:masterClrMapping/>
+  </p:clrMapOvr>
+</p:sld>
+</file>
+
+<file path=ppt/slides/slide19.xml><?xml version="1.0" encoding="utf-8"?>
+<p:sld xmlns:a="http://schemas.openxmlformats.org/drawingml/2006/main" xmlns:r="http://schemas.openxmlformats.org/officeDocument/2006/relationships" xmlns:p="http://schemas.openxmlformats.org/presentationml/2006/main">
+  <p:cSld>
+    <p:spTree>
+      <p:nvGrpSpPr>
+        <p:cNvPr id="1" name=""/>
+        <p:cNvGrpSpPr/>
+        <p:nvPr/>
+      </p:nvGrpSpPr>
+      <p:grpSpPr>
+        <a:xfrm>
+          <a:off x="0" y="0"/>
+          <a:ext cx="0" cy="0"/>
+          <a:chOff x="0" y="0"/>
+          <a:chExt cx="0" cy="0"/>
+        </a:xfrm>
+      </p:grpSpPr>
+      <p:sp>
+        <p:nvSpPr>
+          <p:cNvPr id="2" name="Заголовок 1"/>
+          <p:cNvSpPr>
+            <a:spLocks noGrp="1"/>
+          </p:cNvSpPr>
+          <p:nvPr>
+            <p:ph type="title"/>
+          </p:nvPr>
+        </p:nvSpPr>
+        <p:spPr/>
+        <p:txBody>
+          <a:bodyPr/>
+          <a:lstStyle/>
+          <a:p>
+            <a:r>
+              <a:rPr lang="ru-RU" dirty="0" smtClean="0"/>
+              <a:t>Условие задачи 2</a:t>
+            </a:r>
+            <a:endParaRPr lang="ru-RU" dirty="0"/>
+          </a:p>
+        </p:txBody>
+      </p:sp>
+      <p:sp>
+        <p:nvSpPr>
+          <p:cNvPr id="3" name="Объект 2"/>
+          <p:cNvSpPr>
+            <a:spLocks noGrp="1"/>
+          </p:cNvSpPr>
+          <p:nvPr>
+            <p:ph idx="1"/>
+          </p:nvPr>
+        </p:nvSpPr>
+        <p:spPr/>
+        <p:txBody>
+          <a:bodyPr/>
+          <a:lstStyle/>
+          <a:p>
+            <a:r>
+              <a:rPr lang="ru-RU" dirty="0"/>
+              <a:t>Используя условия прошлой задачи найдите вероятность того, что класс из 30 человек закроют на карантин. Класс закрывают на карантин, если тест дает положительный результат хотя бы на 5 школьниках</a:t>
+            </a:r>
+            <a:r>
+              <a:rPr lang="ru-RU" dirty="0" smtClean="0"/>
+              <a:t>.</a:t>
+            </a:r>
+            <a:endParaRPr lang="ru-RU" dirty="0"/>
+          </a:p>
+        </p:txBody>
+      </p:sp>
+    </p:spTree>
+    <p:extLst>
+      <p:ext uri="{BB962C8B-B14F-4D97-AF65-F5344CB8AC3E}">
+        <p14:creationId xmlns:p14="http://schemas.microsoft.com/office/powerpoint/2010/main" val="3834357699"/>
+      </p:ext>
+    </p:extLst>
+  </p:cSld>
+  <p:clrMapOvr>
+    <a:masterClrMapping/>
+  </p:clrMapOvr>
+</p:sld>
+</file>
+
+<file path=ppt/slides/slide2.xml><?xml version="1.0" encoding="utf-8"?>
+<p:sld xmlns:a="http://schemas.openxmlformats.org/drawingml/2006/main" xmlns:r="http://schemas.openxmlformats.org/officeDocument/2006/relationships" xmlns:p="http://schemas.openxmlformats.org/presentationml/2006/main">
+  <p:cSld>
+    <p:spTree>
+      <p:nvGrpSpPr>
+        <p:cNvPr id="1" name=""/>
+        <p:cNvGrpSpPr/>
+        <p:nvPr/>
+      </p:nvGrpSpPr>
+      <p:grpSpPr>
+        <a:xfrm>
+          <a:off x="0" y="0"/>
+          <a:ext cx="0" cy="0"/>
+          <a:chOff x="0" y="0"/>
+          <a:chExt cx="0" cy="0"/>
+        </a:xfrm>
+      </p:grpSpPr>
+      <p:sp>
+        <p:nvSpPr>
+          <p:cNvPr id="2" name="Заголовок 1"/>
+          <p:cNvSpPr>
+            <a:spLocks noGrp="1"/>
+          </p:cNvSpPr>
+          <p:nvPr>
+            <p:ph type="ctrTitle"/>
+          </p:nvPr>
+        </p:nvSpPr>
+        <p:spPr/>
+        <p:txBody>
+          <a:bodyPr/>
+          <a:lstStyle/>
+          <a:p>
+            <a:r>
+              <a:rPr lang="ru-RU" dirty="0" smtClean="0"/>
+              <a:t>Видео 1</a:t>
+            </a:r>
+            <a:endParaRPr lang="ru-RU" dirty="0"/>
+          </a:p>
+        </p:txBody>
+      </p:sp>
+      <p:sp>
+        <p:nvSpPr>
+          <p:cNvPr id="3" name="Подзаголовок 2"/>
+          <p:cNvSpPr>
+            <a:spLocks noGrp="1"/>
+          </p:cNvSpPr>
+          <p:nvPr>
+            <p:ph type="subTitle" idx="1"/>
+          </p:nvPr>
+        </p:nvSpPr>
+        <p:spPr/>
+        <p:txBody>
+          <a:bodyPr/>
+          <a:lstStyle/>
+          <a:p>
+            <a:endParaRPr lang="ru-RU"/>
+          </a:p>
+        </p:txBody>
+      </p:sp>
+    </p:spTree>
+    <p:extLst>
+      <p:ext uri="{BB962C8B-B14F-4D97-AF65-F5344CB8AC3E}">
+        <p14:creationId xmlns:p14="http://schemas.microsoft.com/office/powerpoint/2010/main" val="3006925586"/>
+      </p:ext>
+    </p:extLst>
+  </p:cSld>
+  <p:clrMapOvr>
+    <a:masterClrMapping/>
+  </p:clrMapOvr>
+</p:sld>
+</file>
+
+<file path=ppt/slides/slide20.xml><?xml version="1.0" encoding="utf-8"?>
+<p:sld xmlns:a="http://schemas.openxmlformats.org/drawingml/2006/main" xmlns:r="http://schemas.openxmlformats.org/officeDocument/2006/relationships" xmlns:p="http://schemas.openxmlformats.org/presentationml/2006/main">
+  <p:cSld>
+    <p:spTree>
+      <p:nvGrpSpPr>
+        <p:cNvPr id="1" name=""/>
+        <p:cNvGrpSpPr/>
+        <p:nvPr/>
+      </p:nvGrpSpPr>
+      <p:grpSpPr>
+        <a:xfrm>
+          <a:off x="0" y="0"/>
+          <a:ext cx="0" cy="0"/>
+          <a:chOff x="0" y="0"/>
+          <a:chExt cx="0" cy="0"/>
+        </a:xfrm>
+      </p:grpSpPr>
+      <p:sp>
+        <p:nvSpPr>
+          <p:cNvPr id="2" name="Заголовок 1"/>
+          <p:cNvSpPr>
+            <a:spLocks noGrp="1"/>
+          </p:cNvSpPr>
+          <p:nvPr>
+            <p:ph type="title"/>
+          </p:nvPr>
+        </p:nvSpPr>
+        <p:spPr/>
+        <p:txBody>
+          <a:bodyPr/>
+          <a:lstStyle/>
+          <a:p>
+            <a:endParaRPr lang="ru-RU"/>
+          </a:p>
+        </p:txBody>
+      </p:sp>
+      <p:sp>
+        <p:nvSpPr>
+          <p:cNvPr id="3" name="Объект 2"/>
+          <p:cNvSpPr>
+            <a:spLocks noGrp="1"/>
+          </p:cNvSpPr>
+          <p:nvPr>
+            <p:ph idx="1"/>
+          </p:nvPr>
+        </p:nvSpPr>
+        <p:spPr/>
+        <p:txBody>
+          <a:bodyPr/>
+          <a:lstStyle/>
+          <a:p>
+            <a:endParaRPr lang="ru-RU"/>
+          </a:p>
+        </p:txBody>
+      </p:sp>
+      <p:pic>
+        <p:nvPicPr>
+          <p:cNvPr id="8194" name="Picture 2" descr="https://latex2png.com/pngs/d78d3d9fa92f891fc2527187b0224161.png"/>
+          <p:cNvPicPr>
+            <a:picLocks noChangeAspect="1" noChangeArrowheads="1"/>
+          </p:cNvPicPr>
+          <p:nvPr/>
+        </p:nvPicPr>
+        <p:blipFill>
+          <a:blip r:embed="rId2">
+            <a:extLst>
+              <a:ext uri="{28A0092B-C50C-407E-A947-70E740481C1C}">
+                <a14:useLocalDpi xmlns:a14="http://schemas.microsoft.com/office/drawing/2010/main" val="0"/>
+              </a:ext>
+            </a:extLst>
+          </a:blip>
+          <a:srcRect/>
+          <a:stretch>
+            <a:fillRect/>
+          </a:stretch>
+        </p:blipFill>
+        <p:spPr bwMode="auto">
+          <a:xfrm>
+            <a:off x="2650205" y="1027906"/>
+            <a:ext cx="7848600" cy="914401"/>
+          </a:xfrm>
+          <a:prstGeom prst="rect">
+            <a:avLst/>
+          </a:prstGeom>
+          <a:noFill/>
+          <a:extLst>
+            <a:ext uri="{909E8E84-426E-40DD-AFC4-6F175D3DCCD1}">
+              <a14:hiddenFill xmlns:a14="http://schemas.microsoft.com/office/drawing/2010/main">
+                <a:solidFill>
+                  <a:srgbClr val="FFFFFF"/>
+                </a:solidFill>
+              </a14:hiddenFill>
+            </a:ext>
+          </a:extLst>
+        </p:spPr>
+      </p:pic>
+      <p:pic>
+        <p:nvPicPr>
+          <p:cNvPr id="8196" name="Picture 4" descr="https://latex2png.com/pngs/f0c9b33dfed63ccbedda7c0eedd134d6.png"/>
+          <p:cNvPicPr>
+            <a:picLocks noChangeAspect="1" noChangeArrowheads="1"/>
+          </p:cNvPicPr>
+          <p:nvPr/>
+        </p:nvPicPr>
+        <p:blipFill>
+          <a:blip r:embed="rId3">
+            <a:extLst>
+              <a:ext uri="{28A0092B-C50C-407E-A947-70E740481C1C}">
+                <a14:useLocalDpi xmlns:a14="http://schemas.microsoft.com/office/drawing/2010/main" val="0"/>
+              </a:ext>
+            </a:extLst>
+          </a:blip>
+          <a:srcRect/>
+          <a:stretch>
+            <a:fillRect/>
+          </a:stretch>
+        </p:blipFill>
+        <p:spPr bwMode="auto">
+          <a:xfrm>
+            <a:off x="3524249" y="2551242"/>
+            <a:ext cx="5143500" cy="790576"/>
+          </a:xfrm>
+          <a:prstGeom prst="rect">
+            <a:avLst/>
+          </a:prstGeom>
+          <a:noFill/>
+          <a:extLst>
+            <a:ext uri="{909E8E84-426E-40DD-AFC4-6F175D3DCCD1}">
+              <a14:hiddenFill xmlns:a14="http://schemas.microsoft.com/office/drawing/2010/main">
+                <a:solidFill>
+                  <a:srgbClr val="FFFFFF"/>
+                </a:solidFill>
+              </a14:hiddenFill>
+            </a:ext>
+          </a:extLst>
+        </p:spPr>
+      </p:pic>
+      <p:pic>
+        <p:nvPicPr>
+          <p:cNvPr id="8200" name="Picture 8" descr="https://latex2png.com/pngs/8857c3b6c9198a1e3fe5be83e2f68053.png"/>
+          <p:cNvPicPr>
+            <a:picLocks noChangeAspect="1" noChangeArrowheads="1"/>
+          </p:cNvPicPr>
+          <p:nvPr/>
+        </p:nvPicPr>
+        <p:blipFill>
+          <a:blip r:embed="rId4">
+            <a:extLst>
+              <a:ext uri="{28A0092B-C50C-407E-A947-70E740481C1C}">
+                <a14:useLocalDpi xmlns:a14="http://schemas.microsoft.com/office/drawing/2010/main" val="0"/>
+              </a:ext>
+            </a:extLst>
+          </a:blip>
+          <a:srcRect/>
+          <a:stretch>
+            <a:fillRect/>
+          </a:stretch>
+        </p:blipFill>
+        <p:spPr bwMode="auto">
+          <a:xfrm>
+            <a:off x="3786187" y="3949313"/>
+            <a:ext cx="4619625" cy="790576"/>
+          </a:xfrm>
+          <a:prstGeom prst="rect">
+            <a:avLst/>
+          </a:prstGeom>
+          <a:noFill/>
+          <a:extLst>
+            <a:ext uri="{909E8E84-426E-40DD-AFC4-6F175D3DCCD1}">
+              <a14:hiddenFill xmlns:a14="http://schemas.microsoft.com/office/drawing/2010/main">
+                <a:solidFill>
+                  <a:srgbClr val="FFFFFF"/>
+                </a:solidFill>
+              </a14:hiddenFill>
+            </a:ext>
+          </a:extLst>
+        </p:spPr>
+      </p:pic>
+    </p:spTree>
+    <p:extLst>
+      <p:ext uri="{BB962C8B-B14F-4D97-AF65-F5344CB8AC3E}">
+        <p14:creationId xmlns:p14="http://schemas.microsoft.com/office/powerpoint/2010/main" val="1028885119"/>
+      </p:ext>
+    </p:extLst>
+  </p:cSld>
+  <p:clrMapOvr>
+    <a:masterClrMapping/>
+  </p:clrMapOvr>
+</p:sld>
+</file>
+
+<file path=ppt/slides/slide21.xml><?xml version="1.0" encoding="utf-8"?>
+<p:sld xmlns:a="http://schemas.openxmlformats.org/drawingml/2006/main" xmlns:r="http://schemas.openxmlformats.org/officeDocument/2006/relationships" xmlns:p="http://schemas.openxmlformats.org/presentationml/2006/main">
+  <p:cSld>
+    <p:spTree>
+      <p:nvGrpSpPr>
+        <p:cNvPr id="1" name=""/>
+        <p:cNvGrpSpPr/>
+        <p:nvPr/>
+      </p:nvGrpSpPr>
+      <p:grpSpPr>
+        <a:xfrm>
+          <a:off x="0" y="0"/>
+          <a:ext cx="0" cy="0"/>
+          <a:chOff x="0" y="0"/>
+          <a:chExt cx="0" cy="0"/>
+        </a:xfrm>
+      </p:grpSpPr>
+      <p:sp>
+        <p:nvSpPr>
+          <p:cNvPr id="2" name="Заголовок 1"/>
+          <p:cNvSpPr>
+            <a:spLocks noGrp="1"/>
+          </p:cNvSpPr>
+          <p:nvPr>
+            <p:ph type="ctrTitle"/>
+          </p:nvPr>
+        </p:nvSpPr>
+        <p:spPr/>
+        <p:txBody>
+          <a:bodyPr/>
+          <a:lstStyle/>
+          <a:p>
+            <a:r>
+              <a:rPr lang="ru-RU" dirty="0" smtClean="0"/>
+              <a:t>Видео 4</a:t>
+            </a:r>
+            <a:endParaRPr lang="ru-RU" dirty="0"/>
+          </a:p>
+        </p:txBody>
+      </p:sp>
+      <p:sp>
+        <p:nvSpPr>
+          <p:cNvPr id="3" name="Подзаголовок 2"/>
+          <p:cNvSpPr>
+            <a:spLocks noGrp="1"/>
+          </p:cNvSpPr>
+          <p:nvPr>
+            <p:ph type="subTitle" idx="1"/>
+          </p:nvPr>
+        </p:nvSpPr>
+        <p:spPr/>
+        <p:txBody>
+          <a:bodyPr/>
+          <a:lstStyle/>
+          <a:p>
+            <a:endParaRPr lang="ru-RU"/>
+          </a:p>
+        </p:txBody>
+      </p:sp>
+    </p:spTree>
+    <p:extLst>
+      <p:ext uri="{BB962C8B-B14F-4D97-AF65-F5344CB8AC3E}">
+        <p14:creationId xmlns:p14="http://schemas.microsoft.com/office/powerpoint/2010/main" val="3433073981"/>
+      </p:ext>
+    </p:extLst>
+  </p:cSld>
+  <p:clrMapOvr>
+    <a:masterClrMapping/>
+  </p:clrMapOvr>
+</p:sld>
+</file>
+
+<file path=ppt/slides/slide3.xml><?xml version="1.0" encoding="utf-8"?>
+<p:sld xmlns:a="http://schemas.openxmlformats.org/drawingml/2006/main" xmlns:r="http://schemas.openxmlformats.org/officeDocument/2006/relationships" xmlns:p="http://schemas.openxmlformats.org/presentationml/2006/main">
+  <p:cSld>
+    <p:spTree>
+      <p:nvGrpSpPr>
+        <p:cNvPr id="1" name=""/>
+        <p:cNvGrpSpPr/>
+        <p:nvPr/>
+      </p:nvGrpSpPr>
+      <p:grpSpPr>
+        <a:xfrm>
+          <a:off x="0" y="0"/>
+          <a:ext cx="0" cy="0"/>
+          <a:chOff x="0" y="0"/>
+          <a:chExt cx="0" cy="0"/>
+        </a:xfrm>
+      </p:grpSpPr>
+      <p:sp>
+        <p:nvSpPr>
+          <p:cNvPr id="2" name="Заголовок 1"/>
+          <p:cNvSpPr>
+            <a:spLocks noGrp="1"/>
+          </p:cNvSpPr>
+          <p:nvPr>
+            <p:ph type="title"/>
+          </p:nvPr>
+        </p:nvSpPr>
+        <p:spPr/>
+        <p:txBody>
+          <a:bodyPr/>
+          <a:lstStyle/>
+          <a:p>
+            <a:r>
+              <a:rPr lang="ru-RU" dirty="0" smtClean="0"/>
+              <a:t>Условие 1 задачи</a:t>
+            </a:r>
+            <a:endParaRPr lang="ru-RU" dirty="0"/>
+          </a:p>
+        </p:txBody>
+      </p:sp>
+      <p:sp>
+        <p:nvSpPr>
+          <p:cNvPr id="3" name="Объект 2"/>
+          <p:cNvSpPr>
+            <a:spLocks noGrp="1"/>
+          </p:cNvSpPr>
+          <p:nvPr>
+            <p:ph idx="1"/>
+          </p:nvPr>
+        </p:nvSpPr>
+        <p:spPr/>
+        <p:txBody>
+          <a:bodyPr/>
+          <a:lstStyle/>
+          <a:p>
+            <a:r>
+              <a:rPr lang="ru-RU" dirty="0" smtClean="0"/>
+              <a:t>Посчитать вероятность </a:t>
+            </a:r>
+            <a:r>
+              <a:rPr lang="ru-RU" dirty="0"/>
+              <a:t>того, что обезьяна </a:t>
+            </a:r>
+            <a:r>
+              <a:rPr lang="ru-RU" dirty="0" smtClean="0"/>
+              <a:t>напечатает </a:t>
+            </a:r>
+            <a:r>
+              <a:rPr lang="ru-RU" dirty="0"/>
+              <a:t>слово "распределение" на клавиатуре, состоящей из 40 </a:t>
+            </a:r>
+            <a:r>
+              <a:rPr lang="ru-RU" dirty="0" smtClean="0"/>
+              <a:t>клавиш</a:t>
+            </a:r>
+            <a:endParaRPr lang="ru-RU" dirty="0"/>
+          </a:p>
+          <a:p>
+            <a:endParaRPr lang="ru-RU" dirty="0"/>
+          </a:p>
+        </p:txBody>
+      </p:sp>
+    </p:spTree>
+    <p:extLst>
+      <p:ext uri="{BB962C8B-B14F-4D97-AF65-F5344CB8AC3E}">
+        <p14:creationId xmlns:p14="http://schemas.microsoft.com/office/powerpoint/2010/main" val="3302214559"/>
+      </p:ext>
+    </p:extLst>
+  </p:cSld>
+  <p:clrMapOvr>
+    <a:masterClrMapping/>
+  </p:clrMapOvr>
+</p:sld>
+</file>
+
+<file path=ppt/slides/slide4.xml><?xml version="1.0" encoding="utf-8"?>
+<p:sld xmlns:a="http://schemas.openxmlformats.org/drawingml/2006/main" xmlns:r="http://schemas.openxmlformats.org/officeDocument/2006/relationships" xmlns:p="http://schemas.openxmlformats.org/presentationml/2006/main">
+  <p:cSld>
+    <p:spTree>
+      <p:nvGrpSpPr>
+        <p:cNvPr id="1" name=""/>
+        <p:cNvGrpSpPr/>
+        <p:nvPr/>
+      </p:nvGrpSpPr>
+      <p:grpSpPr>
+        <a:xfrm>
+          <a:off x="0" y="0"/>
+          <a:ext cx="0" cy="0"/>
+          <a:chOff x="0" y="0"/>
+          <a:chExt cx="0" cy="0"/>
+        </a:xfrm>
+      </p:grpSpPr>
+      <p:sp>
+        <p:nvSpPr>
+          <p:cNvPr id="2" name="Заголовок 1"/>
+          <p:cNvSpPr>
+            <a:spLocks noGrp="1"/>
+          </p:cNvSpPr>
+          <p:nvPr>
+            <p:ph type="title"/>
+          </p:nvPr>
+        </p:nvSpPr>
+        <p:spPr/>
+        <p:txBody>
+          <a:bodyPr/>
+          <a:lstStyle/>
+          <a:p>
+            <a:r>
+              <a:rPr lang="ru-RU" dirty="0" smtClean="0"/>
+              <a:t>Условие 2 задачи</a:t>
+            </a:r>
+            <a:endParaRPr lang="ru-RU" dirty="0"/>
+          </a:p>
+        </p:txBody>
+      </p:sp>
+      <p:sp>
+        <p:nvSpPr>
+          <p:cNvPr id="3" name="Объект 2"/>
+          <p:cNvSpPr>
+            <a:spLocks noGrp="1"/>
+          </p:cNvSpPr>
+          <p:nvPr>
+            <p:ph idx="1"/>
+          </p:nvPr>
+        </p:nvSpPr>
+        <p:spPr/>
+        <p:txBody>
+          <a:bodyPr/>
+          <a:lstStyle/>
+          <a:p>
+            <a:r>
+              <a:rPr lang="ru-RU" dirty="0"/>
+              <a:t>Бросаются два 8-гранных кубика. Нужно найти вероятность того, что сумма очков делится на </a:t>
+            </a:r>
+            <a:r>
+              <a:rPr lang="ru-RU" dirty="0" smtClean="0"/>
+              <a:t>3</a:t>
+            </a:r>
+            <a:endParaRPr lang="ru-RU" dirty="0"/>
+          </a:p>
+          <a:p>
+            <a:endParaRPr lang="ru-RU" dirty="0"/>
+          </a:p>
+        </p:txBody>
+      </p:sp>
+    </p:spTree>
+    <p:extLst>
+      <p:ext uri="{BB962C8B-B14F-4D97-AF65-F5344CB8AC3E}">
+        <p14:creationId xmlns:p14="http://schemas.microsoft.com/office/powerpoint/2010/main" val="2963172071"/>
+      </p:ext>
+    </p:extLst>
+  </p:cSld>
+  <p:clrMapOvr>
+    <a:masterClrMapping/>
+  </p:clrMapOvr>
+</p:sld>
+</file>
+
+<file path=ppt/slides/slide5.xml><?xml version="1.0" encoding="utf-8"?>
+<p:sld xmlns:a="http://schemas.openxmlformats.org/drawingml/2006/main" xmlns:r="http://schemas.openxmlformats.org/officeDocument/2006/relationships" xmlns:p="http://schemas.openxmlformats.org/presentationml/2006/main">
+  <p:cSld>
+    <p:spTree>
+      <p:nvGrpSpPr>
+        <p:cNvPr id="1" name=""/>
+        <p:cNvGrpSpPr/>
+        <p:nvPr/>
+      </p:nvGrpSpPr>
+      <p:grpSpPr>
+        <a:xfrm>
+          <a:off x="0" y="0"/>
+          <a:ext cx="0" cy="0"/>
+          <a:chOff x="0" y="0"/>
+          <a:chExt cx="0" cy="0"/>
+        </a:xfrm>
+      </p:grpSpPr>
+      <p:sp>
+        <p:nvSpPr>
+          <p:cNvPr id="2" name="Заголовок 1"/>
+          <p:cNvSpPr>
+            <a:spLocks noGrp="1"/>
+          </p:cNvSpPr>
+          <p:nvPr>
+            <p:ph type="ctrTitle"/>
+          </p:nvPr>
+        </p:nvSpPr>
+        <p:spPr/>
+        <p:txBody>
+          <a:bodyPr/>
+          <a:lstStyle/>
+          <a:p>
+            <a:r>
+              <a:rPr lang="ru-RU" dirty="0" smtClean="0"/>
+              <a:t>Видео 2</a:t>
+            </a:r>
+            <a:endParaRPr lang="ru-RU" dirty="0"/>
+          </a:p>
+        </p:txBody>
+      </p:sp>
+      <p:sp>
+        <p:nvSpPr>
+          <p:cNvPr id="3" name="Подзаголовок 2"/>
+          <p:cNvSpPr>
+            <a:spLocks noGrp="1"/>
+          </p:cNvSpPr>
+          <p:nvPr>
+            <p:ph type="subTitle" idx="1"/>
+          </p:nvPr>
+        </p:nvSpPr>
+        <p:spPr/>
+        <p:txBody>
+          <a:bodyPr/>
+          <a:lstStyle/>
+          <a:p>
+            <a:endParaRPr lang="ru-RU"/>
+          </a:p>
+        </p:txBody>
+      </p:sp>
+    </p:spTree>
+    <p:extLst>
+      <p:ext uri="{BB962C8B-B14F-4D97-AF65-F5344CB8AC3E}">
+        <p14:creationId xmlns:p14="http://schemas.microsoft.com/office/powerpoint/2010/main" val="1086063279"/>
+      </p:ext>
+    </p:extLst>
+  </p:cSld>
+  <p:clrMapOvr>
+    <a:masterClrMapping/>
+  </p:clrMapOvr>
+</p:sld>
+</file>
+
+<file path=ppt/slides/slide6.xml><?xml version="1.0" encoding="utf-8"?>
+<p:sld xmlns:a="http://schemas.openxmlformats.org/drawingml/2006/main" xmlns:r="http://schemas.openxmlformats.org/officeDocument/2006/relationships" xmlns:p="http://schemas.openxmlformats.org/presentationml/2006/main">
+  <p:cSld>
+    <p:spTree>
+      <p:nvGrpSpPr>
+        <p:cNvPr id="1" name=""/>
+        <p:cNvGrpSpPr/>
+        <p:nvPr/>
+      </p:nvGrpSpPr>
+      <p:grpSpPr>
+        <a:xfrm>
+          <a:off x="0" y="0"/>
+          <a:ext cx="0" cy="0"/>
+          <a:chOff x="0" y="0"/>
+          <a:chExt cx="0" cy="0"/>
+        </a:xfrm>
+      </p:grpSpPr>
+      <p:sp>
+        <p:nvSpPr>
+          <p:cNvPr id="2" name="Заголовок 1"/>
+          <p:cNvSpPr>
+            <a:spLocks noGrp="1"/>
+          </p:cNvSpPr>
+          <p:nvPr>
+            <p:ph type="title"/>
+          </p:nvPr>
+        </p:nvSpPr>
+        <p:spPr/>
+        <p:txBody>
+          <a:bodyPr/>
+          <a:lstStyle/>
+          <a:p>
+            <a:r>
+              <a:rPr lang="ru-RU" dirty="0" smtClean="0"/>
+              <a:t>Условие 1 задачи</a:t>
+            </a:r>
+            <a:endParaRPr lang="ru-RU" dirty="0"/>
+          </a:p>
+        </p:txBody>
+      </p:sp>
+      <p:sp>
+        <p:nvSpPr>
+          <p:cNvPr id="3" name="Объект 2"/>
+          <p:cNvSpPr>
+            <a:spLocks noGrp="1"/>
+          </p:cNvSpPr>
+          <p:nvPr>
+            <p:ph idx="1"/>
+          </p:nvPr>
+        </p:nvSpPr>
+        <p:spPr/>
+        <p:txBody>
+          <a:bodyPr/>
+          <a:lstStyle/>
+          <a:p>
+            <a:r>
+              <a:rPr lang="ru-RU" dirty="0"/>
+              <a:t>Одновременно подбрасывают три кубика и записывают сумму их очков. Если результат превышает 15, то в таблицу записывают 1, а если нет, то 0. Затем значения в таблице суммируют. Какое </a:t>
+            </a:r>
+            <a:r>
+              <a:rPr lang="ru-RU" dirty="0" err="1"/>
+              <a:t>матожидание</a:t>
+            </a:r>
+            <a:r>
+              <a:rPr lang="ru-RU" dirty="0"/>
+              <a:t> этой величины, если проводят серию из 20 бросков?</a:t>
+            </a:r>
+          </a:p>
+          <a:p>
+            <a:endParaRPr lang="ru-RU" dirty="0"/>
+          </a:p>
+        </p:txBody>
+      </p:sp>
+    </p:spTree>
+    <p:extLst>
+      <p:ext uri="{BB962C8B-B14F-4D97-AF65-F5344CB8AC3E}">
+        <p14:creationId xmlns:p14="http://schemas.microsoft.com/office/powerpoint/2010/main" val="2874103774"/>
+      </p:ext>
+    </p:extLst>
+  </p:cSld>
+  <p:clrMapOvr>
+    <a:masterClrMapping/>
+  </p:clrMapOvr>
+</p:sld>
+</file>
+
+<file path=ppt/slides/slide7.xml><?xml version="1.0" encoding="utf-8"?>
+<p:sld xmlns:a="http://schemas.openxmlformats.org/drawingml/2006/main" xmlns:r="http://schemas.openxmlformats.org/officeDocument/2006/relationships" xmlns:p="http://schemas.openxmlformats.org/presentationml/2006/main">
+  <p:cSld>
+    <p:spTree>
+      <p:nvGrpSpPr>
+        <p:cNvPr id="1" name=""/>
+        <p:cNvGrpSpPr/>
+        <p:nvPr/>
+      </p:nvGrpSpPr>
+      <p:grpSpPr>
+        <a:xfrm>
+          <a:off x="0" y="0"/>
+          <a:ext cx="0" cy="0"/>
+          <a:chOff x="0" y="0"/>
+          <a:chExt cx="0" cy="0"/>
+        </a:xfrm>
+      </p:grpSpPr>
+      <p:pic>
+        <p:nvPicPr>
+          <p:cNvPr id="1026" name="Picture 2" descr="https://latex2png.com/pngs/0fd8e79e8ad787f186e169cbb24a4c53.png"/>
+          <p:cNvPicPr>
+            <a:picLocks noChangeAspect="1" noChangeArrowheads="1"/>
+          </p:cNvPicPr>
+          <p:nvPr/>
+        </p:nvPicPr>
+        <p:blipFill>
+          <a:blip r:embed="rId2">
+            <a:extLst>
+              <a:ext uri="{28A0092B-C50C-407E-A947-70E740481C1C}">
+                <a14:useLocalDpi xmlns:a14="http://schemas.microsoft.com/office/drawing/2010/main" val="0"/>
+              </a:ext>
+            </a:extLst>
+          </a:blip>
+          <a:srcRect/>
+          <a:stretch>
+            <a:fillRect/>
+          </a:stretch>
+        </p:blipFill>
+        <p:spPr bwMode="auto">
+          <a:xfrm>
+            <a:off x="793248" y="3977524"/>
+            <a:ext cx="2352675" cy="790576"/>
+          </a:xfrm>
+          <a:prstGeom prst="rect">
+            <a:avLst/>
+          </a:prstGeom>
+          <a:noFill/>
+          <a:extLst>
+            <a:ext uri="{909E8E84-426E-40DD-AFC4-6F175D3DCCD1}">
+              <a14:hiddenFill xmlns:a14="http://schemas.microsoft.com/office/drawing/2010/main">
+                <a:solidFill>
+                  <a:srgbClr val="FFFFFF"/>
+                </a:solidFill>
+              </a14:hiddenFill>
+            </a:ext>
+          </a:extLst>
+        </p:spPr>
+      </p:pic>
+      <p:pic>
+        <p:nvPicPr>
+          <p:cNvPr id="1028" name="Picture 4" descr="https://latex2png.com/pngs/e10df59a8cbda2f888d067c8ab31c763.png"/>
+          <p:cNvPicPr>
+            <a:picLocks noChangeAspect="1" noChangeArrowheads="1"/>
+          </p:cNvPicPr>
+          <p:nvPr/>
+        </p:nvPicPr>
+        <p:blipFill>
+          <a:blip r:embed="rId3">
+            <a:extLst>
+              <a:ext uri="{28A0092B-C50C-407E-A947-70E740481C1C}">
+                <a14:useLocalDpi xmlns:a14="http://schemas.microsoft.com/office/drawing/2010/main" val="0"/>
+              </a:ext>
+            </a:extLst>
+          </a:blip>
+          <a:srcRect/>
+          <a:stretch>
+            <a:fillRect/>
+          </a:stretch>
+        </p:blipFill>
+        <p:spPr bwMode="auto">
+          <a:xfrm>
+            <a:off x="793248" y="2923589"/>
+            <a:ext cx="2352675" cy="790576"/>
+          </a:xfrm>
+          <a:prstGeom prst="rect">
+            <a:avLst/>
+          </a:prstGeom>
+          <a:noFill/>
+          <a:extLst>
+            <a:ext uri="{909E8E84-426E-40DD-AFC4-6F175D3DCCD1}">
+              <a14:hiddenFill xmlns:a14="http://schemas.microsoft.com/office/drawing/2010/main">
+                <a:solidFill>
+                  <a:srgbClr val="FFFFFF"/>
+                </a:solidFill>
+              </a14:hiddenFill>
+            </a:ext>
+          </a:extLst>
+        </p:spPr>
+      </p:pic>
+      <p:pic>
+        <p:nvPicPr>
+          <p:cNvPr id="1030" name="Picture 6" descr="https://latex2png.com/pngs/becffa5d597a5ab59f7c206cb3491094.png"/>
+          <p:cNvPicPr>
+            <a:picLocks noChangeAspect="1" noChangeArrowheads="1"/>
+          </p:cNvPicPr>
+          <p:nvPr/>
+        </p:nvPicPr>
+        <p:blipFill>
+          <a:blip r:embed="rId4">
+            <a:extLst>
+              <a:ext uri="{28A0092B-C50C-407E-A947-70E740481C1C}">
+                <a14:useLocalDpi xmlns:a14="http://schemas.microsoft.com/office/drawing/2010/main" val="0"/>
+              </a:ext>
+            </a:extLst>
+          </a:blip>
+          <a:srcRect/>
+          <a:stretch>
+            <a:fillRect/>
+          </a:stretch>
+        </p:blipFill>
+        <p:spPr bwMode="auto">
+          <a:xfrm>
+            <a:off x="793247" y="1869654"/>
+            <a:ext cx="2352675" cy="790576"/>
+          </a:xfrm>
+          <a:prstGeom prst="rect">
+            <a:avLst/>
+          </a:prstGeom>
+          <a:noFill/>
+          <a:extLst>
+            <a:ext uri="{909E8E84-426E-40DD-AFC4-6F175D3DCCD1}">
+              <a14:hiddenFill xmlns:a14="http://schemas.microsoft.com/office/drawing/2010/main">
+                <a:solidFill>
+                  <a:srgbClr val="FFFFFF"/>
+                </a:solidFill>
+              </a14:hiddenFill>
+            </a:ext>
+          </a:extLst>
+        </p:spPr>
+      </p:pic>
+      <p:pic>
+        <p:nvPicPr>
+          <p:cNvPr id="1032" name="Picture 8" descr="https://latex2png.com/pngs/9d7daa1ae69901c99100ccab81bf7be7.png"/>
+          <p:cNvPicPr>
+            <a:picLocks noChangeAspect="1" noChangeArrowheads="1"/>
+          </p:cNvPicPr>
+          <p:nvPr/>
+        </p:nvPicPr>
+        <p:blipFill>
+          <a:blip r:embed="rId5">
+            <a:extLst>
+              <a:ext uri="{28A0092B-C50C-407E-A947-70E740481C1C}">
+                <a14:useLocalDpi xmlns:a14="http://schemas.microsoft.com/office/drawing/2010/main" val="0"/>
+              </a:ext>
+            </a:extLst>
+          </a:blip>
+          <a:srcRect/>
+          <a:stretch>
+            <a:fillRect/>
+          </a:stretch>
+        </p:blipFill>
+        <p:spPr bwMode="auto">
+          <a:xfrm>
+            <a:off x="5184775" y="1869654"/>
+            <a:ext cx="2352675" cy="790576"/>
+          </a:xfrm>
+          <a:prstGeom prst="rect">
+            <a:avLst/>
+          </a:prstGeom>
+          <a:noFill/>
+          <a:extLst>
+            <a:ext uri="{909E8E84-426E-40DD-AFC4-6F175D3DCCD1}">
+              <a14:hiddenFill xmlns:a14="http://schemas.microsoft.com/office/drawing/2010/main">
+                <a:solidFill>
+                  <a:srgbClr val="FFFFFF"/>
+                </a:solidFill>
+              </a14:hiddenFill>
+            </a:ext>
+          </a:extLst>
+        </p:spPr>
+      </p:pic>
+      <p:pic>
+        <p:nvPicPr>
+          <p:cNvPr id="1034" name="Picture 10" descr="https://latex2png.com/pngs/da384b0d912d9f93f2aa92af985ee9f2.png"/>
+          <p:cNvPicPr>
+            <a:picLocks noChangeAspect="1" noChangeArrowheads="1"/>
+          </p:cNvPicPr>
+          <p:nvPr/>
+        </p:nvPicPr>
+        <p:blipFill>
+          <a:blip r:embed="rId6">
+            <a:extLst>
+              <a:ext uri="{28A0092B-C50C-407E-A947-70E740481C1C}">
+                <a14:useLocalDpi xmlns:a14="http://schemas.microsoft.com/office/drawing/2010/main" val="0"/>
+              </a:ext>
+            </a:extLst>
+          </a:blip>
+          <a:srcRect/>
+          <a:stretch>
+            <a:fillRect/>
+          </a:stretch>
+        </p:blipFill>
+        <p:spPr bwMode="auto">
+          <a:xfrm>
+            <a:off x="5184775" y="2923589"/>
+            <a:ext cx="2352675" cy="790576"/>
+          </a:xfrm>
+          <a:prstGeom prst="rect">
+            <a:avLst/>
+          </a:prstGeom>
+          <a:noFill/>
+          <a:extLst>
+            <a:ext uri="{909E8E84-426E-40DD-AFC4-6F175D3DCCD1}">
+              <a14:hiddenFill xmlns:a14="http://schemas.microsoft.com/office/drawing/2010/main">
+                <a:solidFill>
+                  <a:srgbClr val="FFFFFF"/>
+                </a:solidFill>
+              </a14:hiddenFill>
+            </a:ext>
+          </a:extLst>
+        </p:spPr>
+      </p:pic>
+      <p:pic>
+        <p:nvPicPr>
+          <p:cNvPr id="1036" name="Picture 12" descr="https://latex2png.com/pngs/e35ffd25edf720d90200a976427040c3.png"/>
+          <p:cNvPicPr>
+            <a:picLocks noChangeAspect="1" noChangeArrowheads="1"/>
+          </p:cNvPicPr>
+          <p:nvPr/>
+        </p:nvPicPr>
+        <p:blipFill>
+          <a:blip r:embed="rId7">
+            <a:extLst>
+              <a:ext uri="{28A0092B-C50C-407E-A947-70E740481C1C}">
+                <a14:useLocalDpi xmlns:a14="http://schemas.microsoft.com/office/drawing/2010/main" val="0"/>
+              </a:ext>
+            </a:extLst>
+          </a:blip>
+          <a:srcRect/>
+          <a:stretch>
+            <a:fillRect/>
+          </a:stretch>
+        </p:blipFill>
+        <p:spPr bwMode="auto">
+          <a:xfrm>
+            <a:off x="5184774" y="3977524"/>
+            <a:ext cx="2352675" cy="790576"/>
+          </a:xfrm>
+          <a:prstGeom prst="rect">
+            <a:avLst/>
+          </a:prstGeom>
+          <a:noFill/>
+          <a:extLst>
+            <a:ext uri="{909E8E84-426E-40DD-AFC4-6F175D3DCCD1}">
+              <a14:hiddenFill xmlns:a14="http://schemas.microsoft.com/office/drawing/2010/main">
+                <a:solidFill>
+                  <a:srgbClr val="FFFFFF"/>
+                </a:solidFill>
+              </a14:hiddenFill>
+            </a:ext>
+          </a:extLst>
+        </p:spPr>
+      </p:pic>
+      <p:pic>
+        <p:nvPicPr>
+          <p:cNvPr id="1038" name="Picture 14" descr="https://latex2png.com/pngs/cc15391ddfc9ab0d0d226ea6198f329d.png"/>
+          <p:cNvPicPr>
+            <a:picLocks noChangeAspect="1" noChangeArrowheads="1"/>
+          </p:cNvPicPr>
+          <p:nvPr/>
+        </p:nvPicPr>
+        <p:blipFill>
+          <a:blip r:embed="rId8">
+            <a:extLst>
+              <a:ext uri="{28A0092B-C50C-407E-A947-70E740481C1C}">
+                <a14:useLocalDpi xmlns:a14="http://schemas.microsoft.com/office/drawing/2010/main" val="0"/>
+              </a:ext>
+            </a:extLst>
+          </a:blip>
+          <a:srcRect/>
+          <a:stretch>
+            <a:fillRect/>
+          </a:stretch>
+        </p:blipFill>
+        <p:spPr bwMode="auto">
+          <a:xfrm>
+            <a:off x="9083007" y="1869654"/>
+            <a:ext cx="2352675" cy="790576"/>
+          </a:xfrm>
+          <a:prstGeom prst="rect">
+            <a:avLst/>
+          </a:prstGeom>
+          <a:noFill/>
+          <a:extLst>
+            <a:ext uri="{909E8E84-426E-40DD-AFC4-6F175D3DCCD1}">
+              <a14:hiddenFill xmlns:a14="http://schemas.microsoft.com/office/drawing/2010/main">
+                <a:solidFill>
+                  <a:srgbClr val="FFFFFF"/>
+                </a:solidFill>
+              </a14:hiddenFill>
+            </a:ext>
+          </a:extLst>
+        </p:spPr>
+      </p:pic>
+      <p:pic>
+        <p:nvPicPr>
+          <p:cNvPr id="1040" name="Picture 16" descr="https://latex2png.com/pngs/dd80f1ea90119aa06833d9941c56cbec.png"/>
+          <p:cNvPicPr>
+            <a:picLocks noChangeAspect="1" noChangeArrowheads="1"/>
+          </p:cNvPicPr>
+          <p:nvPr/>
+        </p:nvPicPr>
+        <p:blipFill>
+          <a:blip r:embed="rId9">
+            <a:extLst>
+              <a:ext uri="{28A0092B-C50C-407E-A947-70E740481C1C}">
+                <a14:useLocalDpi xmlns:a14="http://schemas.microsoft.com/office/drawing/2010/main" val="0"/>
+              </a:ext>
+            </a:extLst>
+          </a:blip>
+          <a:srcRect/>
+          <a:stretch>
+            <a:fillRect/>
+          </a:stretch>
+        </p:blipFill>
+        <p:spPr bwMode="auto">
+          <a:xfrm>
+            <a:off x="9083006" y="2923589"/>
+            <a:ext cx="2352675" cy="790576"/>
+          </a:xfrm>
+          <a:prstGeom prst="rect">
+            <a:avLst/>
+          </a:prstGeom>
+          <a:noFill/>
+          <a:extLst>
+            <a:ext uri="{909E8E84-426E-40DD-AFC4-6F175D3DCCD1}">
+              <a14:hiddenFill xmlns:a14="http://schemas.microsoft.com/office/drawing/2010/main">
+                <a:solidFill>
+                  <a:srgbClr val="FFFFFF"/>
+                </a:solidFill>
+              </a14:hiddenFill>
+            </a:ext>
+          </a:extLst>
+        </p:spPr>
+      </p:pic>
+      <p:pic>
+        <p:nvPicPr>
+          <p:cNvPr id="1042" name="Picture 18" descr="https://latex2png.com/pngs/eb41e7b89ec8d8b8505c9c714c1160a6.png"/>
+          <p:cNvPicPr>
+            <a:picLocks noChangeAspect="1" noChangeArrowheads="1"/>
+          </p:cNvPicPr>
+          <p:nvPr/>
+        </p:nvPicPr>
+        <p:blipFill>
+          <a:blip r:embed="rId10">
+            <a:extLst>
+              <a:ext uri="{28A0092B-C50C-407E-A947-70E740481C1C}">
+                <a14:useLocalDpi xmlns:a14="http://schemas.microsoft.com/office/drawing/2010/main" val="0"/>
+              </a:ext>
+            </a:extLst>
+          </a:blip>
+          <a:srcRect/>
+          <a:stretch>
+            <a:fillRect/>
+          </a:stretch>
+        </p:blipFill>
+        <p:spPr bwMode="auto">
+          <a:xfrm>
+            <a:off x="9083005" y="3977524"/>
+            <a:ext cx="2352675" cy="790576"/>
+          </a:xfrm>
+          <a:prstGeom prst="rect">
+            <a:avLst/>
+          </a:prstGeom>
+          <a:noFill/>
+          <a:extLst>
+            <a:ext uri="{909E8E84-426E-40DD-AFC4-6F175D3DCCD1}">
+              <a14:hiddenFill xmlns:a14="http://schemas.microsoft.com/office/drawing/2010/main">
+                <a:solidFill>
+                  <a:srgbClr val="FFFFFF"/>
+                </a:solidFill>
+              </a14:hiddenFill>
+            </a:ext>
+          </a:extLst>
+        </p:spPr>
+      </p:pic>
+      <p:pic>
+        <p:nvPicPr>
+          <p:cNvPr id="1044" name="Picture 20" descr="https://latex2png.com/pngs/ed45fd3994a385b7def1b7cfe34a3d8e.png"/>
+          <p:cNvPicPr>
+            <a:picLocks noChangeAspect="1" noChangeArrowheads="1"/>
+          </p:cNvPicPr>
+          <p:nvPr/>
+        </p:nvPicPr>
+        <p:blipFill>
+          <a:blip r:embed="rId11">
+            <a:extLst>
+              <a:ext uri="{28A0092B-C50C-407E-A947-70E740481C1C}">
+                <a14:useLocalDpi xmlns:a14="http://schemas.microsoft.com/office/drawing/2010/main" val="0"/>
+              </a:ext>
+            </a:extLst>
+          </a:blip>
+          <a:srcRect/>
+          <a:stretch>
+            <a:fillRect/>
+          </a:stretch>
+        </p:blipFill>
+        <p:spPr bwMode="auto">
+          <a:xfrm>
+            <a:off x="9083005" y="5690106"/>
+            <a:ext cx="2352675" cy="790576"/>
+          </a:xfrm>
+          <a:prstGeom prst="rect">
+            <a:avLst/>
+          </a:prstGeom>
+          <a:noFill/>
+          <a:extLst>
+            <a:ext uri="{909E8E84-426E-40DD-AFC4-6F175D3DCCD1}">
+              <a14:hiddenFill xmlns:a14="http://schemas.microsoft.com/office/drawing/2010/main">
+                <a:solidFill>
+                  <a:srgbClr val="FFFFFF"/>
+                </a:solidFill>
+              </a14:hiddenFill>
+            </a:ext>
+          </a:extLst>
+        </p:spPr>
+      </p:pic>
+    </p:spTree>
+    <p:extLst>
+      <p:ext uri="{BB962C8B-B14F-4D97-AF65-F5344CB8AC3E}">
+        <p14:creationId xmlns:p14="http://schemas.microsoft.com/office/powerpoint/2010/main" val="3833546809"/>
+      </p:ext>
+    </p:extLst>
+  </p:cSld>
+  <p:clrMapOvr>
+    <a:masterClrMapping/>
+  </p:clrMapOvr>
+</p:sld>
+</file>
+
+<file path=ppt/slides/slide8.xml><?xml version="1.0" encoding="utf-8"?>
+<p:sld xmlns:a="http://schemas.openxmlformats.org/drawingml/2006/main" xmlns:r="http://schemas.openxmlformats.org/officeDocument/2006/relationships" xmlns:p="http://schemas.openxmlformats.org/presentationml/2006/main">
+  <p:cSld>
+    <p:spTree>
+      <p:nvGrpSpPr>
+        <p:cNvPr id="1" name=""/>
+        <p:cNvGrpSpPr/>
+        <p:nvPr/>
+      </p:nvGrpSpPr>
+      <p:grpSpPr>
+        <a:xfrm>
+          <a:off x="0" y="0"/>
+          <a:ext cx="0" cy="0"/>
+          <a:chOff x="0" y="0"/>
+          <a:chExt cx="0" cy="0"/>
+        </a:xfrm>
+      </p:grpSpPr>
+      <p:sp>
+        <p:nvSpPr>
+          <p:cNvPr id="2" name="Заголовок 1"/>
+          <p:cNvSpPr>
+            <a:spLocks noGrp="1"/>
+          </p:cNvSpPr>
+          <p:nvPr>
+            <p:ph type="title"/>
+          </p:nvPr>
+        </p:nvSpPr>
+        <p:spPr/>
+        <p:txBody>
+          <a:bodyPr/>
+          <a:lstStyle/>
+          <a:p>
+            <a:r>
+              <a:rPr lang="ru-RU" dirty="0" smtClean="0"/>
+              <a:t>Условие 3 задачи</a:t>
+            </a:r>
+            <a:endParaRPr lang="ru-RU" dirty="0"/>
+          </a:p>
+        </p:txBody>
+      </p:sp>
+      <p:sp>
+        <p:nvSpPr>
+          <p:cNvPr id="3" name="Объект 2"/>
+          <p:cNvSpPr>
+            <a:spLocks noGrp="1"/>
+          </p:cNvSpPr>
+          <p:nvPr>
+            <p:ph idx="1"/>
+          </p:nvPr>
+        </p:nvSpPr>
+        <p:spPr/>
+        <p:txBody>
+          <a:bodyPr/>
+          <a:lstStyle/>
+          <a:p>
+            <a:r>
+              <a:rPr lang="ru-RU" dirty="0"/>
+              <a:t>Диаметр подшипников, изготовленных на заводе, представляет собой случайную величину, распределенную нормально с математическим ожиданием 1,5 см и средним </a:t>
+            </a:r>
+            <a:r>
+              <a:rPr lang="ru-RU" dirty="0" err="1"/>
+              <a:t>квадратическим</a:t>
+            </a:r>
+            <a:r>
+              <a:rPr lang="ru-RU" dirty="0"/>
+              <a:t> отклонением 0,04 </a:t>
+            </a:r>
+            <a:r>
+              <a:rPr lang="ru-RU" dirty="0" smtClean="0"/>
+              <a:t>см. Найти </a:t>
+            </a:r>
+            <a:r>
+              <a:rPr lang="ru-RU" dirty="0"/>
+              <a:t>вероятность того, что размер наугад взятого подшипника колеблется от 1,4 до 1,6 </a:t>
+            </a:r>
+            <a:r>
+              <a:rPr lang="ru-RU" dirty="0" smtClean="0"/>
+              <a:t>см. Сначала </a:t>
+            </a:r>
+            <a:r>
+              <a:rPr lang="ru-RU" dirty="0"/>
+              <a:t>решите при помощи правила 3 сигм, а затем получите точный ответ.</a:t>
+            </a:r>
+          </a:p>
+          <a:p>
+            <a:endParaRPr lang="ru-RU" dirty="0"/>
+          </a:p>
+        </p:txBody>
+      </p:sp>
+    </p:spTree>
+    <p:extLst>
+      <p:ext uri="{BB962C8B-B14F-4D97-AF65-F5344CB8AC3E}">
+        <p14:creationId xmlns:p14="http://schemas.microsoft.com/office/powerpoint/2010/main" val="4055078711"/>
+      </p:ext>
+    </p:extLst>
+  </p:cSld>
+  <p:clrMapOvr>
+    <a:masterClrMapping/>
+  </p:clrMapOvr>
+</p:sld>
+</file>
+
+<file path=ppt/slides/slide9.xml><?xml version="1.0" encoding="utf-8"?>
+<p:sld xmlns:a="http://schemas.openxmlformats.org/drawingml/2006/main" xmlns:r="http://schemas.openxmlformats.org/officeDocument/2006/relationships" xmlns:p="http://schemas.openxmlformats.org/presentationml/2006/main">
+  <p:cSld>
+    <p:spTree>
+      <p:nvGrpSpPr>
+        <p:cNvPr id="1" name=""/>
+        <p:cNvGrpSpPr/>
+        <p:nvPr/>
+      </p:nvGrpSpPr>
+      <p:grpSpPr>
+        <a:xfrm>
+          <a:off x="0" y="0"/>
+          <a:ext cx="0" cy="0"/>
+          <a:chOff x="0" y="0"/>
+          <a:chExt cx="0" cy="0"/>
+        </a:xfrm>
+      </p:grpSpPr>
+      <p:sp>
+        <p:nvSpPr>
+          <p:cNvPr id="2" name="Заголовок 1"/>
+          <p:cNvSpPr>
+            <a:spLocks noGrp="1"/>
+          </p:cNvSpPr>
+          <p:nvPr>
+            <p:ph type="title"/>
+          </p:nvPr>
+        </p:nvSpPr>
+        <p:spPr/>
+        <p:txBody>
+          <a:bodyPr/>
+          <a:lstStyle/>
+          <a:p>
+            <a:endParaRPr lang="ru-RU"/>
+          </a:p>
+        </p:txBody>
+      </p:sp>
+      <p:sp>
+        <p:nvSpPr>
+          <p:cNvPr id="3" name="Объект 2"/>
+          <p:cNvSpPr>
+            <a:spLocks noGrp="1"/>
+          </p:cNvSpPr>
+          <p:nvPr>
+            <p:ph idx="1"/>
+          </p:nvPr>
+        </p:nvSpPr>
+        <p:spPr/>
+        <p:txBody>
+          <a:bodyPr/>
+          <a:lstStyle/>
+          <a:p>
+            <a:endParaRPr lang="ru-RU"/>
+          </a:p>
+        </p:txBody>
+      </p:sp>
+      <p:pic>
+        <p:nvPicPr>
+          <p:cNvPr id="2050" name="Picture 2" descr="Числовые характеристики распределения вероятностей - математическое  ожидание, дисперсия и стандартное отклонение"/>
+          <p:cNvPicPr>
+            <a:picLocks noChangeAspect="1" noChangeArrowheads="1"/>
+          </p:cNvPicPr>
+          <p:nvPr/>
+        </p:nvPicPr>
+        <p:blipFill>
+          <a:blip r:embed="rId2">
+            <a:extLst>
+              <a:ext uri="{28A0092B-C50C-407E-A947-70E740481C1C}">
+                <a14:useLocalDpi xmlns:a14="http://schemas.microsoft.com/office/drawing/2010/main" val="0"/>
+              </a:ext>
+            </a:extLst>
+          </a:blip>
+          <a:srcRect/>
+          <a:stretch>
+            <a:fillRect/>
+          </a:stretch>
+        </p:blipFill>
+        <p:spPr bwMode="auto">
+          <a:xfrm>
+            <a:off x="2776537" y="2101056"/>
+            <a:ext cx="6638925" cy="3800476"/>
+          </a:xfrm>
+          <a:prstGeom prst="rect">
+            <a:avLst/>
+          </a:prstGeom>
+          <a:noFill/>
+          <a:extLst>
+            <a:ext uri="{909E8E84-426E-40DD-AFC4-6F175D3DCCD1}">
+              <a14:hiddenFill xmlns:a14="http://schemas.microsoft.com/office/drawing/2010/main">
+                <a:solidFill>
+                  <a:srgbClr val="FFFFFF"/>
+                </a:solidFill>
+              </a14:hiddenFill>
+            </a:ext>
+          </a:extLst>
+        </p:spPr>
+      </p:pic>
+    </p:spTree>
+    <p:extLst>
+      <p:ext uri="{BB962C8B-B14F-4D97-AF65-F5344CB8AC3E}">
+        <p14:creationId xmlns:p14="http://schemas.microsoft.com/office/powerpoint/2010/main" val="3198913375"/>
       </p:ext>
     </p:extLst>
   </p:cSld>

</xml_diff>